<commit_message>
committing changes on 20/10/2017 at 14:59:5
</commit_message>
<xml_diff>
--- a/tex/Templates/Template_slides/DocMASE_template.pptx
+++ b/tex/Templates/Template_slides/DocMASE_template.pptx
@@ -115,7 +115,7 @@
   </p:defaultTextStyle>
   <p:extLst>
     <p:ext uri="{EFAFB233-063F-42B5-8137-9DF3F51BA10A}">
-      <p15:sldGuideLst xmlns:p15="http://schemas.microsoft.com/office/powerpoint/2012/main"/>
+      <p15:sldGuideLst xmlns:p15="http://schemas.microsoft.com/office/powerpoint/2012/main" xmlns=""/>
     </p:ext>
   </p:extLst>
 </p:presentation>
@@ -297,10 +297,11 @@
               <a:defRPr sz="1400"/>
             </a:pPr>
             <a:fld id="{7B4BA380-FA92-450E-8375-97A1E6D127F1}" type="slidenum">
+              <a:rPr/>
               <a:pPr algn="r" hangingPunct="0">
                 <a:defRPr sz="1400"/>
               </a:pPr>
-              <a:t>‹Nr.›</a:t>
+              <a:t>‹N°›</a:t>
             </a:fld>
             <a:endParaRPr lang="it-IT" sz="1300">
               <a:latin typeface="Arial" pitchFamily="18"/>
@@ -313,7 +314,7 @@
     </p:spTree>
     <p:extLst>
       <p:ext uri="{BB962C8B-B14F-4D97-AF65-F5344CB8AC3E}">
-        <p14:creationId xmlns:p14="http://schemas.microsoft.com/office/powerpoint/2010/main" val="270781443"/>
+        <p14:creationId xmlns:p14="http://schemas.microsoft.com/office/powerpoint/2010/main" xmlns="" val="270781443"/>
       </p:ext>
     </p:extLst>
   </p:cSld>
@@ -572,7 +573,9 @@
           <a:p>
             <a:pPr lvl="0"/>
             <a:fld id="{70AFC08F-A31B-40C0-A077-E1D720ACF47E}" type="slidenum">
-              <a:t>‹Nr.›</a:t>
+              <a:rPr/>
+              <a:pPr lvl="0"/>
+              <a:t>‹N°›</a:t>
             </a:fld>
             <a:endParaRPr lang="it-IT"/>
           </a:p>
@@ -581,7 +584,7 @@
     </p:spTree>
     <p:extLst>
       <p:ext uri="{BB962C8B-B14F-4D97-AF65-F5344CB8AC3E}">
-        <p14:creationId xmlns:p14="http://schemas.microsoft.com/office/powerpoint/2010/main" val="1023803412"/>
+        <p14:creationId xmlns:p14="http://schemas.microsoft.com/office/powerpoint/2010/main" xmlns="" val="1023803412"/>
       </p:ext>
     </p:extLst>
   </p:cSld>
@@ -720,6 +723,8 @@
           <a:p>
             <a:pPr lvl="0"/>
             <a:fld id="{0D089B4F-BF18-4D52-BBB4-E78478797D36}" type="slidenum">
+              <a:rPr/>
+              <a:pPr lvl="0"/>
               <a:t>1</a:t>
             </a:fld>
             <a:endParaRPr lang="it-IT"/>
@@ -783,7 +788,7 @@
     </p:spTree>
     <p:extLst>
       <p:ext uri="{BB962C8B-B14F-4D97-AF65-F5344CB8AC3E}">
-        <p14:creationId xmlns:p14="http://schemas.microsoft.com/office/powerpoint/2010/main" val="952395979"/>
+        <p14:creationId xmlns:p14="http://schemas.microsoft.com/office/powerpoint/2010/main" xmlns="" val="952395979"/>
       </p:ext>
     </p:extLst>
   </p:cSld>
@@ -831,6 +836,8 @@
           <a:p>
             <a:pPr lvl="0"/>
             <a:fld id="{5CFDD0B3-B99C-4EB3-8B63-0263036B285D}" type="slidenum">
+              <a:rPr/>
+              <a:pPr lvl="0"/>
               <a:t>2</a:t>
             </a:fld>
             <a:endParaRPr lang="it-IT"/>
@@ -887,7 +894,7 @@
     </p:spTree>
     <p:extLst>
       <p:ext uri="{BB962C8B-B14F-4D97-AF65-F5344CB8AC3E}">
-        <p14:creationId xmlns:p14="http://schemas.microsoft.com/office/powerpoint/2010/main" val="3181710027"/>
+        <p14:creationId xmlns:p14="http://schemas.microsoft.com/office/powerpoint/2010/main" xmlns="" val="3181710027"/>
       </p:ext>
     </p:extLst>
   </p:cSld>
@@ -935,6 +942,8 @@
           <a:p>
             <a:pPr lvl="0"/>
             <a:fld id="{5CFDD0B3-B99C-4EB3-8B63-0263036B285D}" type="slidenum">
+              <a:rPr/>
+              <a:pPr lvl="0"/>
               <a:t>3</a:t>
             </a:fld>
             <a:endParaRPr lang="it-IT"/>
@@ -991,7 +1000,7 @@
     </p:spTree>
     <p:extLst>
       <p:ext uri="{BB962C8B-B14F-4D97-AF65-F5344CB8AC3E}">
-        <p14:creationId xmlns:p14="http://schemas.microsoft.com/office/powerpoint/2010/main" val="1581373124"/>
+        <p14:creationId xmlns:p14="http://schemas.microsoft.com/office/powerpoint/2010/main" xmlns="" val="1581373124"/>
       </p:ext>
     </p:extLst>
   </p:cSld>
@@ -1039,6 +1048,8 @@
           <a:p>
             <a:pPr lvl="0"/>
             <a:fld id="{4DA3F896-B449-40C0-AFE4-49B34C102D99}" type="slidenum">
+              <a:rPr/>
+              <a:pPr lvl="0"/>
               <a:t>4</a:t>
             </a:fld>
             <a:endParaRPr lang="it-IT"/>
@@ -1095,7 +1106,7 @@
     </p:spTree>
     <p:extLst>
       <p:ext uri="{BB962C8B-B14F-4D97-AF65-F5344CB8AC3E}">
-        <p14:creationId xmlns:p14="http://schemas.microsoft.com/office/powerpoint/2010/main" val="1834532727"/>
+        <p14:creationId xmlns:p14="http://schemas.microsoft.com/office/powerpoint/2010/main" xmlns="" val="1834532727"/>
       </p:ext>
     </p:extLst>
   </p:cSld>
@@ -1276,7 +1287,9 @@
           <a:p>
             <a:pPr lvl="0"/>
             <a:fld id="{AA01FCEB-495A-404F-ABE5-74D7C328B88E}" type="slidenum">
-              <a:t>‹Nr.›</a:t>
+              <a:rPr/>
+              <a:pPr lvl="0"/>
+              <a:t>‹N°›</a:t>
             </a:fld>
             <a:endParaRPr lang="it-IT"/>
           </a:p>
@@ -1285,7 +1298,7 @@
     </p:spTree>
     <p:extLst>
       <p:ext uri="{BB962C8B-B14F-4D97-AF65-F5344CB8AC3E}">
-        <p14:creationId xmlns:p14="http://schemas.microsoft.com/office/powerpoint/2010/main" val="3591337536"/>
+        <p14:creationId xmlns:p14="http://schemas.microsoft.com/office/powerpoint/2010/main" xmlns="" val="3591337536"/>
       </p:ext>
     </p:extLst>
   </p:cSld>
@@ -1444,7 +1457,9 @@
           <a:p>
             <a:pPr lvl="0"/>
             <a:fld id="{C70E7802-EFFE-4935-AF6F-33BA8E5E7000}" type="slidenum">
-              <a:t>‹Nr.›</a:t>
+              <a:rPr/>
+              <a:pPr lvl="0"/>
+              <a:t>‹N°›</a:t>
             </a:fld>
             <a:endParaRPr lang="it-IT"/>
           </a:p>
@@ -1453,7 +1468,7 @@
     </p:spTree>
     <p:extLst>
       <p:ext uri="{BB962C8B-B14F-4D97-AF65-F5344CB8AC3E}">
-        <p14:creationId xmlns:p14="http://schemas.microsoft.com/office/powerpoint/2010/main" val="1356066653"/>
+        <p14:creationId xmlns:p14="http://schemas.microsoft.com/office/powerpoint/2010/main" xmlns="" val="1356066653"/>
       </p:ext>
     </p:extLst>
   </p:cSld>
@@ -1622,7 +1637,9 @@
           <a:p>
             <a:pPr lvl="0"/>
             <a:fld id="{C6363DB5-4B5E-4B46-9082-6FC82A010BE0}" type="slidenum">
-              <a:t>‹Nr.›</a:t>
+              <a:rPr/>
+              <a:pPr lvl="0"/>
+              <a:t>‹N°›</a:t>
             </a:fld>
             <a:endParaRPr lang="it-IT"/>
           </a:p>
@@ -1631,7 +1648,7 @@
     </p:spTree>
     <p:extLst>
       <p:ext uri="{BB962C8B-B14F-4D97-AF65-F5344CB8AC3E}">
-        <p14:creationId xmlns:p14="http://schemas.microsoft.com/office/powerpoint/2010/main" val="1495760003"/>
+        <p14:creationId xmlns:p14="http://schemas.microsoft.com/office/powerpoint/2010/main" xmlns="" val="1495760003"/>
       </p:ext>
     </p:extLst>
   </p:cSld>
@@ -1790,7 +1807,9 @@
           <a:p>
             <a:pPr lvl="0"/>
             <a:fld id="{CA9B2B32-AF97-4F51-AF69-8A3F09C9C2F3}" type="slidenum">
-              <a:t>‹Nr.›</a:t>
+              <a:rPr/>
+              <a:pPr lvl="0"/>
+              <a:t>‹N°›</a:t>
             </a:fld>
             <a:endParaRPr lang="it-IT"/>
           </a:p>
@@ -1799,7 +1818,7 @@
     </p:spTree>
     <p:extLst>
       <p:ext uri="{BB962C8B-B14F-4D97-AF65-F5344CB8AC3E}">
-        <p14:creationId xmlns:p14="http://schemas.microsoft.com/office/powerpoint/2010/main" val="716493952"/>
+        <p14:creationId xmlns:p14="http://schemas.microsoft.com/office/powerpoint/2010/main" xmlns="" val="716493952"/>
       </p:ext>
     </p:extLst>
   </p:cSld>
@@ -2034,7 +2053,9 @@
           <a:p>
             <a:pPr lvl="0"/>
             <a:fld id="{2F05D71C-4E81-4723-A8F7-5AA4DE824EC4}" type="slidenum">
-              <a:t>‹Nr.›</a:t>
+              <a:rPr/>
+              <a:pPr lvl="0"/>
+              <a:t>‹N°›</a:t>
             </a:fld>
             <a:endParaRPr lang="it-IT"/>
           </a:p>
@@ -2043,7 +2064,7 @@
     </p:spTree>
     <p:extLst>
       <p:ext uri="{BB962C8B-B14F-4D97-AF65-F5344CB8AC3E}">
-        <p14:creationId xmlns:p14="http://schemas.microsoft.com/office/powerpoint/2010/main" val="2025354508"/>
+        <p14:creationId xmlns:p14="http://schemas.microsoft.com/office/powerpoint/2010/main" xmlns="" val="2025354508"/>
       </p:ext>
     </p:extLst>
   </p:cSld>
@@ -2264,7 +2285,9 @@
           <a:p>
             <a:pPr lvl="0"/>
             <a:fld id="{68E4AECD-E82F-4F28-A4A8-7495D4CA88B2}" type="slidenum">
-              <a:t>‹Nr.›</a:t>
+              <a:rPr/>
+              <a:pPr lvl="0"/>
+              <a:t>‹N°›</a:t>
             </a:fld>
             <a:endParaRPr lang="it-IT"/>
           </a:p>
@@ -2273,7 +2296,7 @@
     </p:spTree>
     <p:extLst>
       <p:ext uri="{BB962C8B-B14F-4D97-AF65-F5344CB8AC3E}">
-        <p14:creationId xmlns:p14="http://schemas.microsoft.com/office/powerpoint/2010/main" val="2098408279"/>
+        <p14:creationId xmlns:p14="http://schemas.microsoft.com/office/powerpoint/2010/main" xmlns="" val="2098408279"/>
       </p:ext>
     </p:extLst>
   </p:cSld>
@@ -2629,7 +2652,9 @@
           <a:p>
             <a:pPr lvl="0"/>
             <a:fld id="{84B89A36-4167-4419-BEB9-3949F222012A}" type="slidenum">
-              <a:t>‹Nr.›</a:t>
+              <a:rPr/>
+              <a:pPr lvl="0"/>
+              <a:t>‹N°›</a:t>
             </a:fld>
             <a:endParaRPr lang="it-IT"/>
           </a:p>
@@ -2638,7 +2663,7 @@
     </p:spTree>
     <p:extLst>
       <p:ext uri="{BB962C8B-B14F-4D97-AF65-F5344CB8AC3E}">
-        <p14:creationId xmlns:p14="http://schemas.microsoft.com/office/powerpoint/2010/main" val="760692630"/>
+        <p14:creationId xmlns:p14="http://schemas.microsoft.com/office/powerpoint/2010/main" xmlns="" val="760692630"/>
       </p:ext>
     </p:extLst>
   </p:cSld>
@@ -2745,7 +2770,9 @@
           <a:p>
             <a:pPr lvl="0"/>
             <a:fld id="{52448B09-7EC9-477B-A0F8-886F7F4AFFB2}" type="slidenum">
-              <a:t>‹Nr.›</a:t>
+              <a:rPr/>
+              <a:pPr lvl="0"/>
+              <a:t>‹N°›</a:t>
             </a:fld>
             <a:endParaRPr lang="it-IT"/>
           </a:p>
@@ -2754,7 +2781,7 @@
     </p:spTree>
     <p:extLst>
       <p:ext uri="{BB962C8B-B14F-4D97-AF65-F5344CB8AC3E}">
-        <p14:creationId xmlns:p14="http://schemas.microsoft.com/office/powerpoint/2010/main" val="4102194855"/>
+        <p14:creationId xmlns:p14="http://schemas.microsoft.com/office/powerpoint/2010/main" xmlns="" val="4102194855"/>
       </p:ext>
     </p:extLst>
   </p:cSld>
@@ -2838,7 +2865,9 @@
           <a:p>
             <a:pPr lvl="0"/>
             <a:fld id="{9EF3F116-9D6A-484B-8322-E1280F91A2B0}" type="slidenum">
-              <a:t>‹Nr.›</a:t>
+              <a:rPr/>
+              <a:pPr lvl="0"/>
+              <a:t>‹N°›</a:t>
             </a:fld>
             <a:endParaRPr lang="it-IT"/>
           </a:p>
@@ -2847,7 +2876,7 @@
     </p:spTree>
     <p:extLst>
       <p:ext uri="{BB962C8B-B14F-4D97-AF65-F5344CB8AC3E}">
-        <p14:creationId xmlns:p14="http://schemas.microsoft.com/office/powerpoint/2010/main" val="3977027298"/>
+        <p14:creationId xmlns:p14="http://schemas.microsoft.com/office/powerpoint/2010/main" xmlns="" val="3977027298"/>
       </p:ext>
     </p:extLst>
   </p:cSld>
@@ -3114,7 +3143,9 @@
           <a:p>
             <a:pPr lvl="0"/>
             <a:fld id="{ED38B4BC-6EEF-4EDB-9872-8C9645B72A13}" type="slidenum">
-              <a:t>‹Nr.›</a:t>
+              <a:rPr/>
+              <a:pPr lvl="0"/>
+              <a:t>‹N°›</a:t>
             </a:fld>
             <a:endParaRPr lang="it-IT"/>
           </a:p>
@@ -3123,7 +3154,7 @@
     </p:spTree>
     <p:extLst>
       <p:ext uri="{BB962C8B-B14F-4D97-AF65-F5344CB8AC3E}">
-        <p14:creationId xmlns:p14="http://schemas.microsoft.com/office/powerpoint/2010/main" val="3001024517"/>
+        <p14:creationId xmlns:p14="http://schemas.microsoft.com/office/powerpoint/2010/main" xmlns="" val="3001024517"/>
       </p:ext>
     </p:extLst>
   </p:cSld>
@@ -3365,7 +3396,9 @@
           <a:p>
             <a:pPr lvl="0"/>
             <a:fld id="{570C9120-16DB-4A00-AB49-32656BC94BC6}" type="slidenum">
-              <a:t>‹Nr.›</a:t>
+              <a:rPr/>
+              <a:pPr lvl="0"/>
+              <a:t>‹N°›</a:t>
             </a:fld>
             <a:endParaRPr lang="it-IT"/>
           </a:p>
@@ -3374,7 +3407,7 @@
     </p:spTree>
     <p:extLst>
       <p:ext uri="{BB962C8B-B14F-4D97-AF65-F5344CB8AC3E}">
-        <p14:creationId xmlns:p14="http://schemas.microsoft.com/office/powerpoint/2010/main" val="467813891"/>
+        <p14:creationId xmlns:p14="http://schemas.microsoft.com/office/powerpoint/2010/main" xmlns="" val="467813891"/>
       </p:ext>
     </p:extLst>
   </p:cSld>
@@ -3631,7 +3664,9 @@
           <a:p>
             <a:pPr lvl="0"/>
             <a:fld id="{AD7979CB-4F3B-4849-AD4A-65CF1D1A3D65}" type="slidenum">
-              <a:t>‹Nr.›</a:t>
+              <a:rPr/>
+              <a:pPr lvl="0"/>
+              <a:t>‹N°›</a:t>
             </a:fld>
             <a:endParaRPr lang="it-IT"/>
           </a:p>
@@ -3958,7 +3993,7 @@
           <a:blip r:embed="rId3" cstate="print">
             <a:extLst>
               <a:ext uri="{28A0092B-C50C-407E-A947-70E740481C1C}">
-                <a14:useLocalDpi xmlns:a14="http://schemas.microsoft.com/office/drawing/2010/main" val="0"/>
+                <a14:useLocalDpi xmlns:a14="http://schemas.microsoft.com/office/drawing/2010/main" xmlns="" val="0"/>
               </a:ext>
             </a:extLst>
           </a:blip>
@@ -3969,7 +4004,7 @@
         <p:spPr>
           <a:xfrm>
             <a:off x="204770" y="42268"/>
-            <a:ext cx="1464410" cy="720000"/>
+            <a:ext cx="1229747" cy="604624"/>
           </a:xfrm>
           <a:prstGeom prst="rect">
             <a:avLst/>
@@ -3985,10 +4020,10 @@
           <p:nvPr/>
         </p:nvPicPr>
         <p:blipFill>
-          <a:blip r:embed="rId4">
+          <a:blip r:embed="rId4" cstate="print">
             <a:extLst>
               <a:ext uri="{28A0092B-C50C-407E-A947-70E740481C1C}">
-                <a14:useLocalDpi xmlns:a14="http://schemas.microsoft.com/office/drawing/2010/main" val="0"/>
+                <a14:useLocalDpi xmlns:a14="http://schemas.microsoft.com/office/drawing/2010/main" xmlns="" val="0"/>
               </a:ext>
             </a:extLst>
           </a:blip>
@@ -4015,10 +4050,10 @@
           <p:nvPr/>
         </p:nvPicPr>
         <p:blipFill>
-          <a:blip r:embed="rId5">
+          <a:blip r:embed="rId5" cstate="print">
             <a:extLst>
               <a:ext uri="{28A0092B-C50C-407E-A947-70E740481C1C}">
-                <a14:useLocalDpi xmlns:a14="http://schemas.microsoft.com/office/drawing/2010/main" val="0"/>
+                <a14:useLocalDpi xmlns:a14="http://schemas.microsoft.com/office/drawing/2010/main" xmlns="" val="0"/>
               </a:ext>
             </a:extLst>
           </a:blip>
@@ -4045,10 +4080,10 @@
           <p:nvPr/>
         </p:nvPicPr>
         <p:blipFill>
-          <a:blip r:embed="rId6">
+          <a:blip r:embed="rId6" cstate="print">
             <a:extLst>
               <a:ext uri="{28A0092B-C50C-407E-A947-70E740481C1C}">
-                <a14:useLocalDpi xmlns:a14="http://schemas.microsoft.com/office/drawing/2010/main" val="0"/>
+                <a14:useLocalDpi xmlns:a14="http://schemas.microsoft.com/office/drawing/2010/main" xmlns="" val="0"/>
               </a:ext>
             </a:extLst>
           </a:blip>
@@ -4075,10 +4110,10 @@
           <p:nvPr/>
         </p:nvPicPr>
         <p:blipFill>
-          <a:blip r:embed="rId7">
+          <a:blip r:embed="rId7" cstate="print">
             <a:extLst>
               <a:ext uri="{28A0092B-C50C-407E-A947-70E740481C1C}">
-                <a14:useLocalDpi xmlns:a14="http://schemas.microsoft.com/office/drawing/2010/main" val="0"/>
+                <a14:useLocalDpi xmlns:a14="http://schemas.microsoft.com/office/drawing/2010/main" xmlns="" val="0"/>
               </a:ext>
             </a:extLst>
           </a:blip>
@@ -4105,10 +4140,10 @@
           <p:nvPr/>
         </p:nvPicPr>
         <p:blipFill>
-          <a:blip r:embed="rId8">
+          <a:blip r:embed="rId8" cstate="print">
             <a:extLst>
               <a:ext uri="{28A0092B-C50C-407E-A947-70E740481C1C}">
-                <a14:useLocalDpi xmlns:a14="http://schemas.microsoft.com/office/drawing/2010/main" val="0"/>
+                <a14:useLocalDpi xmlns:a14="http://schemas.microsoft.com/office/drawing/2010/main" xmlns="" val="0"/>
               </a:ext>
             </a:extLst>
           </a:blip>
@@ -4160,10 +4195,10 @@
           <p:nvPr/>
         </p:nvPicPr>
         <p:blipFill>
-          <a:blip r:embed="rId3">
+          <a:blip r:embed="rId3" cstate="print">
             <a:extLst>
               <a:ext uri="{28A0092B-C50C-407E-A947-70E740481C1C}">
-                <a14:useLocalDpi xmlns:a14="http://schemas.microsoft.com/office/drawing/2010/main" val="0"/>
+                <a14:useLocalDpi xmlns:a14="http://schemas.microsoft.com/office/drawing/2010/main" xmlns="" val="0"/>
               </a:ext>
             </a:extLst>
           </a:blip>
@@ -4175,36 +4210,6 @@
           <a:xfrm>
             <a:off x="4579794" y="42268"/>
             <a:ext cx="920410" cy="720000"/>
-          </a:xfrm>
-          <a:prstGeom prst="rect">
-            <a:avLst/>
-          </a:prstGeom>
-        </p:spPr>
-      </p:pic>
-      <p:pic>
-        <p:nvPicPr>
-          <p:cNvPr id="4" name="Grafik 3"/>
-          <p:cNvPicPr>
-            <a:picLocks noChangeAspect="1"/>
-          </p:cNvPicPr>
-          <p:nvPr/>
-        </p:nvPicPr>
-        <p:blipFill>
-          <a:blip r:embed="rId4" cstate="print">
-            <a:extLst>
-              <a:ext uri="{28A0092B-C50C-407E-A947-70E740481C1C}">
-                <a14:useLocalDpi xmlns:a14="http://schemas.microsoft.com/office/drawing/2010/main" val="0"/>
-              </a:ext>
-            </a:extLst>
-          </a:blip>
-          <a:stretch>
-            <a:fillRect/>
-          </a:stretch>
-        </p:blipFill>
-        <p:spPr>
-          <a:xfrm>
-            <a:off x="204770" y="42268"/>
-            <a:ext cx="1464410" cy="720000"/>
           </a:xfrm>
           <a:prstGeom prst="rect">
             <a:avLst/>
@@ -4263,10 +4268,10 @@
           <p:nvPr/>
         </p:nvPicPr>
         <p:blipFill>
-          <a:blip r:embed="rId5">
+          <a:blip r:embed="rId4" cstate="print">
             <a:extLst>
               <a:ext uri="{28A0092B-C50C-407E-A947-70E740481C1C}">
-                <a14:useLocalDpi xmlns:a14="http://schemas.microsoft.com/office/drawing/2010/main" val="0"/>
+                <a14:useLocalDpi xmlns:a14="http://schemas.microsoft.com/office/drawing/2010/main" xmlns="" val="0"/>
               </a:ext>
             </a:extLst>
           </a:blip>
@@ -4278,6 +4283,36 @@
           <a:xfrm>
             <a:off x="7163177" y="76468"/>
             <a:ext cx="2857500" cy="685800"/>
+          </a:xfrm>
+          <a:prstGeom prst="rect">
+            <a:avLst/>
+          </a:prstGeom>
+        </p:spPr>
+      </p:pic>
+      <p:pic>
+        <p:nvPicPr>
+          <p:cNvPr id="8" name="Grafik 9"/>
+          <p:cNvPicPr>
+            <a:picLocks noChangeAspect="1"/>
+          </p:cNvPicPr>
+          <p:nvPr/>
+        </p:nvPicPr>
+        <p:blipFill>
+          <a:blip r:embed="rId5" cstate="print">
+            <a:extLst>
+              <a:ext uri="{28A0092B-C50C-407E-A947-70E740481C1C}">
+                <a14:useLocalDpi xmlns:a14="http://schemas.microsoft.com/office/drawing/2010/main" xmlns="" val="0"/>
+              </a:ext>
+            </a:extLst>
+          </a:blip>
+          <a:stretch>
+            <a:fillRect/>
+          </a:stretch>
+        </p:blipFill>
+        <p:spPr>
+          <a:xfrm>
+            <a:off x="204770" y="42268"/>
+            <a:ext cx="1229747" cy="604624"/>
           </a:xfrm>
           <a:prstGeom prst="rect">
             <a:avLst/>
@@ -4318,10 +4353,10 @@
           <p:nvPr/>
         </p:nvPicPr>
         <p:blipFill>
-          <a:blip r:embed="rId3">
+          <a:blip r:embed="rId3" cstate="print">
             <a:extLst>
               <a:ext uri="{28A0092B-C50C-407E-A947-70E740481C1C}">
-                <a14:useLocalDpi xmlns:a14="http://schemas.microsoft.com/office/drawing/2010/main" val="0"/>
+                <a14:useLocalDpi xmlns:a14="http://schemas.microsoft.com/office/drawing/2010/main" xmlns="" val="0"/>
               </a:ext>
             </a:extLst>
           </a:blip>
@@ -4333,36 +4368,6 @@
           <a:xfrm>
             <a:off x="4579794" y="42268"/>
             <a:ext cx="920410" cy="720000"/>
-          </a:xfrm>
-          <a:prstGeom prst="rect">
-            <a:avLst/>
-          </a:prstGeom>
-        </p:spPr>
-      </p:pic>
-      <p:pic>
-        <p:nvPicPr>
-          <p:cNvPr id="4" name="Grafik 3"/>
-          <p:cNvPicPr>
-            <a:picLocks noChangeAspect="1"/>
-          </p:cNvPicPr>
-          <p:nvPr/>
-        </p:nvPicPr>
-        <p:blipFill>
-          <a:blip r:embed="rId4" cstate="print">
-            <a:extLst>
-              <a:ext uri="{28A0092B-C50C-407E-A947-70E740481C1C}">
-                <a14:useLocalDpi xmlns:a14="http://schemas.microsoft.com/office/drawing/2010/main" val="0"/>
-              </a:ext>
-            </a:extLst>
-          </a:blip>
-          <a:stretch>
-            <a:fillRect/>
-          </a:stretch>
-        </p:blipFill>
-        <p:spPr>
-          <a:xfrm>
-            <a:off x="204770" y="42268"/>
-            <a:ext cx="1464410" cy="720000"/>
           </a:xfrm>
           <a:prstGeom prst="rect">
             <a:avLst/>
@@ -4421,10 +4426,10 @@
           <p:nvPr/>
         </p:nvPicPr>
         <p:blipFill>
-          <a:blip r:embed="rId5">
+          <a:blip r:embed="rId4" cstate="print">
             <a:extLst>
               <a:ext uri="{28A0092B-C50C-407E-A947-70E740481C1C}">
-                <a14:useLocalDpi xmlns:a14="http://schemas.microsoft.com/office/drawing/2010/main" val="0"/>
+                <a14:useLocalDpi xmlns:a14="http://schemas.microsoft.com/office/drawing/2010/main" xmlns="" val="0"/>
               </a:ext>
             </a:extLst>
           </a:blip>
@@ -4442,10 +4447,40 @@
           </a:prstGeom>
         </p:spPr>
       </p:pic>
+      <p:pic>
+        <p:nvPicPr>
+          <p:cNvPr id="8" name="Grafik 9"/>
+          <p:cNvPicPr>
+            <a:picLocks noChangeAspect="1"/>
+          </p:cNvPicPr>
+          <p:nvPr/>
+        </p:nvPicPr>
+        <p:blipFill>
+          <a:blip r:embed="rId5" cstate="print">
+            <a:extLst>
+              <a:ext uri="{28A0092B-C50C-407E-A947-70E740481C1C}">
+                <a14:useLocalDpi xmlns:a14="http://schemas.microsoft.com/office/drawing/2010/main" xmlns="" val="0"/>
+              </a:ext>
+            </a:extLst>
+          </a:blip>
+          <a:stretch>
+            <a:fillRect/>
+          </a:stretch>
+        </p:blipFill>
+        <p:spPr>
+          <a:xfrm>
+            <a:off x="204770" y="42268"/>
+            <a:ext cx="1229747" cy="604624"/>
+          </a:xfrm>
+          <a:prstGeom prst="rect">
+            <a:avLst/>
+          </a:prstGeom>
+        </p:spPr>
+      </p:pic>
     </p:spTree>
     <p:extLst>
       <p:ext uri="{BB962C8B-B14F-4D97-AF65-F5344CB8AC3E}">
-        <p14:creationId xmlns:p14="http://schemas.microsoft.com/office/powerpoint/2010/main" val="1431820652"/>
+        <p14:creationId xmlns:p14="http://schemas.microsoft.com/office/powerpoint/2010/main" xmlns="" val="1431820652"/>
       </p:ext>
     </p:extLst>
   </p:cSld>
@@ -4481,10 +4516,10 @@
           <p:nvPr/>
         </p:nvPicPr>
         <p:blipFill>
-          <a:blip r:embed="rId3">
+          <a:blip r:embed="rId3" cstate="print">
             <a:extLst>
               <a:ext uri="{28A0092B-C50C-407E-A947-70E740481C1C}">
-                <a14:useLocalDpi xmlns:a14="http://schemas.microsoft.com/office/drawing/2010/main" val="0"/>
+                <a14:useLocalDpi xmlns:a14="http://schemas.microsoft.com/office/drawing/2010/main" xmlns="" val="0"/>
               </a:ext>
             </a:extLst>
           </a:blip>
@@ -4511,10 +4546,10 @@
           <p:nvPr/>
         </p:nvPicPr>
         <p:blipFill>
-          <a:blip r:embed="rId4">
+          <a:blip r:embed="rId4" cstate="print">
             <a:extLst>
               <a:ext uri="{28A0092B-C50C-407E-A947-70E740481C1C}">
-                <a14:useLocalDpi xmlns:a14="http://schemas.microsoft.com/office/drawing/2010/main" val="0"/>
+                <a14:useLocalDpi xmlns:a14="http://schemas.microsoft.com/office/drawing/2010/main" xmlns="" val="0"/>
               </a:ext>
             </a:extLst>
           </a:blip>
@@ -4541,10 +4576,10 @@
           <p:nvPr/>
         </p:nvPicPr>
         <p:blipFill>
-          <a:blip r:embed="rId5">
+          <a:blip r:embed="rId5" cstate="print">
             <a:extLst>
               <a:ext uri="{28A0092B-C50C-407E-A947-70E740481C1C}">
-                <a14:useLocalDpi xmlns:a14="http://schemas.microsoft.com/office/drawing/2010/main" val="0"/>
+                <a14:useLocalDpi xmlns:a14="http://schemas.microsoft.com/office/drawing/2010/main" xmlns="" val="0"/>
               </a:ext>
             </a:extLst>
           </a:blip>
@@ -4571,10 +4606,10 @@
           <p:nvPr/>
         </p:nvPicPr>
         <p:blipFill>
-          <a:blip r:embed="rId6">
+          <a:blip r:embed="rId6" cstate="print">
             <a:extLst>
               <a:ext uri="{28A0092B-C50C-407E-A947-70E740481C1C}">
-                <a14:useLocalDpi xmlns:a14="http://schemas.microsoft.com/office/drawing/2010/main" val="0"/>
+                <a14:useLocalDpi xmlns:a14="http://schemas.microsoft.com/office/drawing/2010/main" xmlns="" val="0"/>
               </a:ext>
             </a:extLst>
           </a:blip>
@@ -4604,7 +4639,7 @@
           <a:blip r:embed="rId7" cstate="print">
             <a:extLst>
               <a:ext uri="{28A0092B-C50C-407E-A947-70E740481C1C}">
-                <a14:useLocalDpi xmlns:a14="http://schemas.microsoft.com/office/drawing/2010/main" val="0"/>
+                <a14:useLocalDpi xmlns:a14="http://schemas.microsoft.com/office/drawing/2010/main" xmlns="" val="0"/>
               </a:ext>
             </a:extLst>
           </a:blip>
@@ -4631,10 +4666,10 @@
           <p:nvPr/>
         </p:nvPicPr>
         <p:blipFill>
-          <a:blip r:embed="rId8">
+          <a:blip r:embed="rId8" cstate="print">
             <a:extLst>
               <a:ext uri="{28A0092B-C50C-407E-A947-70E740481C1C}">
-                <a14:useLocalDpi xmlns:a14="http://schemas.microsoft.com/office/drawing/2010/main" val="0"/>
+                <a14:useLocalDpi xmlns:a14="http://schemas.microsoft.com/office/drawing/2010/main" xmlns="" val="0"/>
               </a:ext>
             </a:extLst>
           </a:blip>
@@ -4703,7 +4738,7 @@
     </a:clrScheme>
     <a:fontScheme name="Office">
       <a:majorFont>
-        <a:latin typeface="Calibri Light" panose="020F0302020204030204"/>
+        <a:latin typeface="Calibri Light"/>
         <a:ea typeface=""/>
         <a:cs typeface=""/>
         <a:font script="Jpan" typeface="ＭＳ Ｐゴシック"/>
@@ -4738,7 +4773,7 @@
         <a:font script="Geor" typeface="Sylfaen"/>
       </a:majorFont>
       <a:minorFont>
-        <a:latin typeface="Calibri" panose="020F0502020204030204"/>
+        <a:latin typeface="Calibri"/>
         <a:ea typeface=""/>
         <a:cs typeface=""/>
         <a:font script="Jpan" typeface="ＭＳ Ｐゴシック"/>
@@ -4915,7 +4950,7 @@
   <a:extraClrSchemeLst/>
   <a:extLst>
     <a:ext uri="{05A4C25C-085E-4340-85A3-A5531E510DB2}">
-      <thm15:themeFamily xmlns:thm15="http://schemas.microsoft.com/office/thememl/2012/main" name="Office Theme" id="{62F939B6-93AF-4DB8-9C6B-D6C7DFDC589F}" vid="{4A3C46E8-61CC-4603-A589-7422A47A8E4A}"/>
+      <thm15:themeFamily xmlns:thm15="http://schemas.microsoft.com/office/thememl/2012/main" xmlns="" name="Office Theme" id="{62F939B6-93AF-4DB8-9C6B-D6C7DFDC589F}" vid="{4A3C46E8-61CC-4603-A589-7422A47A8E4A}"/>
     </a:ext>
   </a:extLst>
 </a:theme>
@@ -4964,7 +4999,7 @@
     </a:clrScheme>
     <a:fontScheme name="Office">
       <a:majorFont>
-        <a:latin typeface="Calibri Light" panose="020F0302020204030204"/>
+        <a:latin typeface="Calibri Light"/>
         <a:ea typeface=""/>
         <a:cs typeface=""/>
         <a:font script="Jpan" typeface="ＭＳ Ｐゴシック"/>
@@ -4999,7 +5034,7 @@
         <a:font script="Geor" typeface="Sylfaen"/>
       </a:majorFont>
       <a:minorFont>
-        <a:latin typeface="Calibri" panose="020F0502020204030204"/>
+        <a:latin typeface="Calibri"/>
         <a:ea typeface=""/>
         <a:cs typeface=""/>
         <a:font script="Jpan" typeface="ＭＳ Ｐゴシック"/>
@@ -5176,7 +5211,7 @@
   <a:extraClrSchemeLst/>
   <a:extLst>
     <a:ext uri="{05A4C25C-085E-4340-85A3-A5531E510DB2}">
-      <thm15:themeFamily xmlns:thm15="http://schemas.microsoft.com/office/thememl/2012/main" name="Office Theme" id="{62F939B6-93AF-4DB8-9C6B-D6C7DFDC589F}" vid="{4A3C46E8-61CC-4603-A589-7422A47A8E4A}"/>
+      <thm15:themeFamily xmlns:thm15="http://schemas.microsoft.com/office/thememl/2012/main" xmlns="" name="Office Theme" id="{62F939B6-93AF-4DB8-9C6B-D6C7DFDC589F}" vid="{4A3C46E8-61CC-4603-A589-7422A47A8E4A}"/>
     </a:ext>
   </a:extLst>
 </a:theme>
@@ -5225,7 +5260,7 @@
     </a:clrScheme>
     <a:fontScheme name="Office">
       <a:majorFont>
-        <a:latin typeface="Calibri Light" panose="020F0302020204030204"/>
+        <a:latin typeface="Calibri Light"/>
         <a:ea typeface=""/>
         <a:cs typeface=""/>
         <a:font script="Jpan" typeface="ＭＳ Ｐゴシック"/>
@@ -5260,7 +5295,7 @@
         <a:font script="Geor" typeface="Sylfaen"/>
       </a:majorFont>
       <a:minorFont>
-        <a:latin typeface="Calibri" panose="020F0502020204030204"/>
+        <a:latin typeface="Calibri"/>
         <a:ea typeface=""/>
         <a:cs typeface=""/>
         <a:font script="Jpan" typeface="ＭＳ Ｐゴシック"/>
@@ -5437,7 +5472,7 @@
   <a:extraClrSchemeLst/>
   <a:extLst>
     <a:ext uri="{05A4C25C-085E-4340-85A3-A5531E510DB2}">
-      <thm15:themeFamily xmlns:thm15="http://schemas.microsoft.com/office/thememl/2012/main" name="Office Theme" id="{62F939B6-93AF-4DB8-9C6B-D6C7DFDC589F}" vid="{4A3C46E8-61CC-4603-A589-7422A47A8E4A}"/>
+      <thm15:themeFamily xmlns:thm15="http://schemas.microsoft.com/office/thememl/2012/main" xmlns="" name="Office Theme" id="{62F939B6-93AF-4DB8-9C6B-D6C7DFDC589F}" vid="{4A3C46E8-61CC-4603-A589-7422A47A8E4A}"/>
     </a:ext>
   </a:extLst>
 </a:theme>

</xml_diff>

<commit_message>
commit on 01/05/2019 at 19:04:27
</commit_message>
<xml_diff>
--- a/tex/Templates/Template_slides/DocMASE_template.pptx
+++ b/tex/Templates/Template_slides/DocMASE_template.pptx
@@ -1,25 +1,407 @@
 
 <file path=ppt/presentation.xml><?xml version="1.0" encoding="utf-8"?>
-<p:presentation xmlns:a="http://schemas.openxmlformats.org/drawingml/2006/main" xmlns:p="http://schemas.openxmlformats.org/presentationml/2006/main" xmlns:r="http://schemas.openxmlformats.org/officeDocument/2006/relationships">
+<p:presentation xmlns:a="http://schemas.openxmlformats.org/drawingml/2006/main" xmlns:r="http://schemas.openxmlformats.org/officeDocument/2006/relationships" xmlns:p="http://schemas.openxmlformats.org/presentationml/2006/main">
   <p:sldMasterIdLst>
-    <p:sldMasterId id="2147483648" r:id="rId2"/>
+    <p:sldMasterId id="2147483648" r:id="rId1"/>
   </p:sldMasterIdLst>
   <p:notesMasterIdLst>
-    <p:notesMasterId r:id="rId3"/>
+    <p:notesMasterId r:id="rId6"/>
   </p:notesMasterIdLst>
   <p:sldIdLst>
-    <p:sldId id="256" r:id="rId4"/>
-    <p:sldId id="257" r:id="rId5"/>
-    <p:sldId id="258" r:id="rId6"/>
-    <p:sldId id="259" r:id="rId7"/>
+    <p:sldId id="256" r:id="rId2"/>
+    <p:sldId id="257" r:id="rId3"/>
+    <p:sldId id="258" r:id="rId4"/>
+    <p:sldId id="259" r:id="rId5"/>
   </p:sldIdLst>
   <p:sldSz cx="10080625" cy="7559675"/>
-  <p:notesSz cx="7099300" cy="10234612"/>
+  <p:notesSz cx="7099300" cy="10234613"/>
+  <p:defaultTextStyle>
+    <a:defPPr>
+      <a:defRPr lang="en-US"/>
+    </a:defPPr>
+    <a:lvl1pPr marL="0" algn="l" defTabSz="914400" rtl="0" eaLnBrk="1" latinLnBrk="0" hangingPunct="1">
+      <a:defRPr sz="1800" kern="1200">
+        <a:solidFill>
+          <a:schemeClr val="tx1"/>
+        </a:solidFill>
+        <a:latin typeface="+mn-lt"/>
+        <a:ea typeface="+mn-ea"/>
+        <a:cs typeface="+mn-cs"/>
+      </a:defRPr>
+    </a:lvl1pPr>
+    <a:lvl2pPr marL="457200" algn="l" defTabSz="914400" rtl="0" eaLnBrk="1" latinLnBrk="0" hangingPunct="1">
+      <a:defRPr sz="1800" kern="1200">
+        <a:solidFill>
+          <a:schemeClr val="tx1"/>
+        </a:solidFill>
+        <a:latin typeface="+mn-lt"/>
+        <a:ea typeface="+mn-ea"/>
+        <a:cs typeface="+mn-cs"/>
+      </a:defRPr>
+    </a:lvl2pPr>
+    <a:lvl3pPr marL="914400" algn="l" defTabSz="914400" rtl="0" eaLnBrk="1" latinLnBrk="0" hangingPunct="1">
+      <a:defRPr sz="1800" kern="1200">
+        <a:solidFill>
+          <a:schemeClr val="tx1"/>
+        </a:solidFill>
+        <a:latin typeface="+mn-lt"/>
+        <a:ea typeface="+mn-ea"/>
+        <a:cs typeface="+mn-cs"/>
+      </a:defRPr>
+    </a:lvl3pPr>
+    <a:lvl4pPr marL="1371600" algn="l" defTabSz="914400" rtl="0" eaLnBrk="1" latinLnBrk="0" hangingPunct="1">
+      <a:defRPr sz="1800" kern="1200">
+        <a:solidFill>
+          <a:schemeClr val="tx1"/>
+        </a:solidFill>
+        <a:latin typeface="+mn-lt"/>
+        <a:ea typeface="+mn-ea"/>
+        <a:cs typeface="+mn-cs"/>
+      </a:defRPr>
+    </a:lvl4pPr>
+    <a:lvl5pPr marL="1828800" algn="l" defTabSz="914400" rtl="0" eaLnBrk="1" latinLnBrk="0" hangingPunct="1">
+      <a:defRPr sz="1800" kern="1200">
+        <a:solidFill>
+          <a:schemeClr val="tx1"/>
+        </a:solidFill>
+        <a:latin typeface="+mn-lt"/>
+        <a:ea typeface="+mn-ea"/>
+        <a:cs typeface="+mn-cs"/>
+      </a:defRPr>
+    </a:lvl5pPr>
+    <a:lvl6pPr marL="2286000" algn="l" defTabSz="914400" rtl="0" eaLnBrk="1" latinLnBrk="0" hangingPunct="1">
+      <a:defRPr sz="1800" kern="1200">
+        <a:solidFill>
+          <a:schemeClr val="tx1"/>
+        </a:solidFill>
+        <a:latin typeface="+mn-lt"/>
+        <a:ea typeface="+mn-ea"/>
+        <a:cs typeface="+mn-cs"/>
+      </a:defRPr>
+    </a:lvl6pPr>
+    <a:lvl7pPr marL="2743200" algn="l" defTabSz="914400" rtl="0" eaLnBrk="1" latinLnBrk="0" hangingPunct="1">
+      <a:defRPr sz="1800" kern="1200">
+        <a:solidFill>
+          <a:schemeClr val="tx1"/>
+        </a:solidFill>
+        <a:latin typeface="+mn-lt"/>
+        <a:ea typeface="+mn-ea"/>
+        <a:cs typeface="+mn-cs"/>
+      </a:defRPr>
+    </a:lvl7pPr>
+    <a:lvl8pPr marL="3200400" algn="l" defTabSz="914400" rtl="0" eaLnBrk="1" latinLnBrk="0" hangingPunct="1">
+      <a:defRPr sz="1800" kern="1200">
+        <a:solidFill>
+          <a:schemeClr val="tx1"/>
+        </a:solidFill>
+        <a:latin typeface="+mn-lt"/>
+        <a:ea typeface="+mn-ea"/>
+        <a:cs typeface="+mn-cs"/>
+      </a:defRPr>
+    </a:lvl8pPr>
+    <a:lvl9pPr marL="3657600" algn="l" defTabSz="914400" rtl="0" eaLnBrk="1" latinLnBrk="0" hangingPunct="1">
+      <a:defRPr sz="1800" kern="1200">
+        <a:solidFill>
+          <a:schemeClr val="tx1"/>
+        </a:solidFill>
+        <a:latin typeface="+mn-lt"/>
+        <a:ea typeface="+mn-ea"/>
+        <a:cs typeface="+mn-cs"/>
+      </a:defRPr>
+    </a:lvl9pPr>
+  </p:defaultTextStyle>
 </p:presentation>
 </file>
 
 <file path=ppt/notesMasters/notesMaster1.xml><?xml version="1.0" encoding="utf-8"?>
-<p:notesMaster xmlns:a="http://schemas.openxmlformats.org/drawingml/2006/main" xmlns:p="http://schemas.openxmlformats.org/presentationml/2006/main" xmlns:r="http://schemas.openxmlformats.org/officeDocument/2006/relationships">
+<p:notesMaster xmlns:a="http://schemas.openxmlformats.org/drawingml/2006/main" xmlns:r="http://schemas.openxmlformats.org/officeDocument/2006/relationships" xmlns:p="http://schemas.openxmlformats.org/presentationml/2006/main">
+  <p:cSld>
+    <p:bg>
+      <p:bgRef idx="1001">
+        <a:schemeClr val="bg1"/>
+      </p:bgRef>
+    </p:bg>
+    <p:spTree>
+      <p:nvGrpSpPr>
+        <p:cNvPr id="1" name=""/>
+        <p:cNvGrpSpPr/>
+        <p:nvPr/>
+      </p:nvGrpSpPr>
+      <p:grpSpPr>
+        <a:xfrm>
+          <a:off x="0" y="0"/>
+          <a:ext cx="0" cy="0"/>
+          <a:chOff x="0" y="0"/>
+          <a:chExt cx="0" cy="0"/>
+        </a:xfrm>
+      </p:grpSpPr>
+      <p:sp>
+        <p:nvSpPr>
+          <p:cNvPr id="39" name="PlaceHolder 1"/>
+          <p:cNvSpPr>
+            <a:spLocks noGrp="1"/>
+          </p:cNvSpPr>
+          <p:nvPr>
+            <p:ph type="body"/>
+          </p:nvPr>
+        </p:nvSpPr>
+        <p:spPr>
+          <a:xfrm>
+            <a:off x="756000" y="5078520"/>
+            <a:ext cx="6047640" cy="4811040"/>
+          </a:xfrm>
+          <a:prstGeom prst="rect">
+            <a:avLst/>
+          </a:prstGeom>
+        </p:spPr>
+        <p:txBody>
+          <a:bodyPr lIns="0" tIns="0" rIns="0" bIns="0"/>
+          <a:lstStyle/>
+          <a:p>
+            <a:r>
+              <a:rPr lang="en-US" sz="2000">
+                <a:latin typeface="Arial"/>
+              </a:rPr>
+              <a:t>Click to edit the notes format</a:t>
+            </a:r>
+            <a:endParaRPr/>
+          </a:p>
+        </p:txBody>
+      </p:sp>
+      <p:sp>
+        <p:nvSpPr>
+          <p:cNvPr id="40" name="PlaceHolder 2"/>
+          <p:cNvSpPr>
+            <a:spLocks noGrp="1"/>
+          </p:cNvSpPr>
+          <p:nvPr>
+            <p:ph type="hdr"/>
+          </p:nvPr>
+        </p:nvSpPr>
+        <p:spPr>
+          <a:xfrm>
+            <a:off x="0" y="0"/>
+            <a:ext cx="3280680" cy="534240"/>
+          </a:xfrm>
+          <a:prstGeom prst="rect">
+            <a:avLst/>
+          </a:prstGeom>
+        </p:spPr>
+        <p:txBody>
+          <a:bodyPr lIns="0" tIns="0" rIns="0" bIns="0"/>
+          <a:lstStyle/>
+          <a:p>
+            <a:r>
+              <a:rPr lang="en-US" sz="1400">
+                <a:latin typeface="Times New Roman"/>
+              </a:rPr>
+              <a:t>&lt;header&gt;</a:t>
+            </a:r>
+            <a:endParaRPr/>
+          </a:p>
+        </p:txBody>
+      </p:sp>
+      <p:sp>
+        <p:nvSpPr>
+          <p:cNvPr id="41" name="PlaceHolder 3"/>
+          <p:cNvSpPr>
+            <a:spLocks noGrp="1"/>
+          </p:cNvSpPr>
+          <p:nvPr>
+            <p:ph type="dt"/>
+          </p:nvPr>
+        </p:nvSpPr>
+        <p:spPr>
+          <a:xfrm>
+            <a:off x="4278960" y="0"/>
+            <a:ext cx="3280680" cy="534240"/>
+          </a:xfrm>
+          <a:prstGeom prst="rect">
+            <a:avLst/>
+          </a:prstGeom>
+        </p:spPr>
+        <p:txBody>
+          <a:bodyPr lIns="0" tIns="0" rIns="0" bIns="0"/>
+          <a:lstStyle/>
+          <a:p>
+            <a:pPr algn="r"/>
+            <a:r>
+              <a:rPr lang="en-US" sz="1400">
+                <a:latin typeface="Times New Roman"/>
+              </a:rPr>
+              <a:t>&lt;date/time&gt;</a:t>
+            </a:r>
+            <a:endParaRPr/>
+          </a:p>
+        </p:txBody>
+      </p:sp>
+      <p:sp>
+        <p:nvSpPr>
+          <p:cNvPr id="42" name="PlaceHolder 4"/>
+          <p:cNvSpPr>
+            <a:spLocks noGrp="1"/>
+          </p:cNvSpPr>
+          <p:nvPr>
+            <p:ph type="ftr"/>
+          </p:nvPr>
+        </p:nvSpPr>
+        <p:spPr>
+          <a:xfrm>
+            <a:off x="0" y="10157400"/>
+            <a:ext cx="3280680" cy="534240"/>
+          </a:xfrm>
+          <a:prstGeom prst="rect">
+            <a:avLst/>
+          </a:prstGeom>
+        </p:spPr>
+        <p:txBody>
+          <a:bodyPr lIns="0" tIns="0" rIns="0" bIns="0" anchor="b"/>
+          <a:lstStyle/>
+          <a:p>
+            <a:r>
+              <a:rPr lang="en-US" sz="1400">
+                <a:latin typeface="Times New Roman"/>
+              </a:rPr>
+              <a:t>&lt;footer&gt;</a:t>
+            </a:r>
+            <a:endParaRPr/>
+          </a:p>
+        </p:txBody>
+      </p:sp>
+      <p:sp>
+        <p:nvSpPr>
+          <p:cNvPr id="43" name="PlaceHolder 5"/>
+          <p:cNvSpPr>
+            <a:spLocks noGrp="1"/>
+          </p:cNvSpPr>
+          <p:nvPr>
+            <p:ph type="sldNum"/>
+          </p:nvPr>
+        </p:nvSpPr>
+        <p:spPr>
+          <a:xfrm>
+            <a:off x="4278960" y="10157400"/>
+            <a:ext cx="3280680" cy="534240"/>
+          </a:xfrm>
+          <a:prstGeom prst="rect">
+            <a:avLst/>
+          </a:prstGeom>
+        </p:spPr>
+        <p:txBody>
+          <a:bodyPr lIns="0" tIns="0" rIns="0" bIns="0" anchor="b"/>
+          <a:lstStyle/>
+          <a:p>
+            <a:pPr algn="r"/>
+            <a:fld id="{D3B44ACD-2815-496E-B1A3-E0BF2B9F978C}" type="slidenum">
+              <a:rPr lang="en-US" sz="1400">
+                <a:latin typeface="Times New Roman"/>
+              </a:rPr>
+              <a:t>‹#›</a:t>
+            </a:fld>
+            <a:endParaRPr/>
+          </a:p>
+        </p:txBody>
+      </p:sp>
+    </p:spTree>
+  </p:cSld>
+  <p:clrMap bg1="lt1" tx1="dk1" bg2="lt2" tx2="dk2" accent1="accent1" accent2="accent2" accent3="accent3" accent4="accent4" accent5="accent5" accent6="accent6" hlink="hlink" folHlink="folHlink"/>
+  <p:notesStyle>
+    <a:lvl1pPr marL="0" algn="l" defTabSz="914400" rtl="0" eaLnBrk="1" latinLnBrk="0" hangingPunct="1">
+      <a:defRPr sz="1200" kern="1200">
+        <a:solidFill>
+          <a:schemeClr val="tx1"/>
+        </a:solidFill>
+        <a:latin typeface="+mn-lt"/>
+        <a:ea typeface="+mn-ea"/>
+        <a:cs typeface="+mn-cs"/>
+      </a:defRPr>
+    </a:lvl1pPr>
+    <a:lvl2pPr marL="457200" algn="l" defTabSz="914400" rtl="0" eaLnBrk="1" latinLnBrk="0" hangingPunct="1">
+      <a:defRPr sz="1200" kern="1200">
+        <a:solidFill>
+          <a:schemeClr val="tx1"/>
+        </a:solidFill>
+        <a:latin typeface="+mn-lt"/>
+        <a:ea typeface="+mn-ea"/>
+        <a:cs typeface="+mn-cs"/>
+      </a:defRPr>
+    </a:lvl2pPr>
+    <a:lvl3pPr marL="914400" algn="l" defTabSz="914400" rtl="0" eaLnBrk="1" latinLnBrk="0" hangingPunct="1">
+      <a:defRPr sz="1200" kern="1200">
+        <a:solidFill>
+          <a:schemeClr val="tx1"/>
+        </a:solidFill>
+        <a:latin typeface="+mn-lt"/>
+        <a:ea typeface="+mn-ea"/>
+        <a:cs typeface="+mn-cs"/>
+      </a:defRPr>
+    </a:lvl3pPr>
+    <a:lvl4pPr marL="1371600" algn="l" defTabSz="914400" rtl="0" eaLnBrk="1" latinLnBrk="0" hangingPunct="1">
+      <a:defRPr sz="1200" kern="1200">
+        <a:solidFill>
+          <a:schemeClr val="tx1"/>
+        </a:solidFill>
+        <a:latin typeface="+mn-lt"/>
+        <a:ea typeface="+mn-ea"/>
+        <a:cs typeface="+mn-cs"/>
+      </a:defRPr>
+    </a:lvl4pPr>
+    <a:lvl5pPr marL="1828800" algn="l" defTabSz="914400" rtl="0" eaLnBrk="1" latinLnBrk="0" hangingPunct="1">
+      <a:defRPr sz="1200" kern="1200">
+        <a:solidFill>
+          <a:schemeClr val="tx1"/>
+        </a:solidFill>
+        <a:latin typeface="+mn-lt"/>
+        <a:ea typeface="+mn-ea"/>
+        <a:cs typeface="+mn-cs"/>
+      </a:defRPr>
+    </a:lvl5pPr>
+    <a:lvl6pPr marL="2286000" algn="l" defTabSz="914400" rtl="0" eaLnBrk="1" latinLnBrk="0" hangingPunct="1">
+      <a:defRPr sz="1200" kern="1200">
+        <a:solidFill>
+          <a:schemeClr val="tx1"/>
+        </a:solidFill>
+        <a:latin typeface="+mn-lt"/>
+        <a:ea typeface="+mn-ea"/>
+        <a:cs typeface="+mn-cs"/>
+      </a:defRPr>
+    </a:lvl6pPr>
+    <a:lvl7pPr marL="2743200" algn="l" defTabSz="914400" rtl="0" eaLnBrk="1" latinLnBrk="0" hangingPunct="1">
+      <a:defRPr sz="1200" kern="1200">
+        <a:solidFill>
+          <a:schemeClr val="tx1"/>
+        </a:solidFill>
+        <a:latin typeface="+mn-lt"/>
+        <a:ea typeface="+mn-ea"/>
+        <a:cs typeface="+mn-cs"/>
+      </a:defRPr>
+    </a:lvl7pPr>
+    <a:lvl8pPr marL="3200400" algn="l" defTabSz="914400" rtl="0" eaLnBrk="1" latinLnBrk="0" hangingPunct="1">
+      <a:defRPr sz="1200" kern="1200">
+        <a:solidFill>
+          <a:schemeClr val="tx1"/>
+        </a:solidFill>
+        <a:latin typeface="+mn-lt"/>
+        <a:ea typeface="+mn-ea"/>
+        <a:cs typeface="+mn-cs"/>
+      </a:defRPr>
+    </a:lvl8pPr>
+    <a:lvl9pPr marL="3657600" algn="l" defTabSz="914400" rtl="0" eaLnBrk="1" latinLnBrk="0" hangingPunct="1">
+      <a:defRPr sz="1200" kern="1200">
+        <a:solidFill>
+          <a:schemeClr val="tx1"/>
+        </a:solidFill>
+        <a:latin typeface="+mn-lt"/>
+        <a:ea typeface="+mn-ea"/>
+        <a:cs typeface="+mn-cs"/>
+      </a:defRPr>
+    </a:lvl9pPr>
+  </p:notesStyle>
+</p:notesMaster>
+</file>
+
+<file path=ppt/notesSlides/notesSlide1.xml><?xml version="1.0" encoding="utf-8"?>
+<p:notes xmlns:a="http://schemas.openxmlformats.org/drawingml/2006/main" xmlns:r="http://schemas.openxmlformats.org/officeDocument/2006/relationships" xmlns:p="http://schemas.openxmlformats.org/presentationml/2006/main">
   <p:cSld>
     <p:spTree>
       <p:nvGrpSpPr>
@@ -37,7 +419,42 @@
       </p:grpSpPr>
       <p:sp>
         <p:nvSpPr>
-          <p:cNvPr id="39" name="PlaceHolder 1"/>
+          <p:cNvPr id="71" name="TextShape 1"/>
+          <p:cNvSpPr txBox="1"/>
+          <p:nvPr/>
+        </p:nvSpPr>
+        <p:spPr>
+          <a:xfrm>
+            <a:off x="4018320" y="9722880"/>
+            <a:ext cx="3080520" cy="511200"/>
+          </a:xfrm>
+          <a:prstGeom prst="rect">
+            <a:avLst/>
+          </a:prstGeom>
+        </p:spPr>
+        <p:txBody>
+          <a:bodyPr lIns="0" tIns="0" rIns="0" bIns="0" anchor="b"/>
+          <a:lstStyle/>
+          <a:p>
+            <a:pPr>
+              <a:lnSpc>
+                <a:spcPct val="100000"/>
+              </a:lnSpc>
+            </a:pPr>
+            <a:fld id="{08F925C0-2300-4A1C-B7B6-EACF11700DF9}" type="slidenum">
+              <a:rPr lang="en-US" sz="1300">
+                <a:latin typeface="Times New Roman"/>
+                <a:ea typeface="Arial Unicode MS"/>
+              </a:rPr>
+              <a:t>1</a:t>
+            </a:fld>
+            <a:endParaRPr/>
+          </a:p>
+        </p:txBody>
+      </p:sp>
+      <p:sp>
+        <p:nvSpPr>
+          <p:cNvPr id="72" name="PlaceHolder 2"/>
           <p:cNvSpPr>
             <a:spLocks noGrp="1"/>
           </p:cNvSpPr>
@@ -47,164 +464,31 @@
         </p:nvSpPr>
         <p:spPr>
           <a:xfrm>
-            <a:off x="756000" y="5078520"/>
-            <a:ext cx="6047640" cy="4811040"/>
-          </a:xfrm>
-          <a:prstGeom prst="rect">
-            <a:avLst/>
-          </a:prstGeom>
-        </p:spPr>
-        <p:txBody>
-          <a:bodyPr lIns="0" rIns="0" tIns="0" bIns="0"/>
-          <a:p>
-            <a:r>
-              <a:rPr lang="en-US" sz="2000">
-                <a:latin typeface="Arial"/>
-              </a:rPr>
-              <a:t>Click to edit the notes format</a:t>
-            </a:r>
-            <a:endParaRPr/>
-          </a:p>
-        </p:txBody>
-      </p:sp>
-      <p:sp>
-        <p:nvSpPr>
-          <p:cNvPr id="40" name="PlaceHolder 2"/>
-          <p:cNvSpPr>
-            <a:spLocks noGrp="1"/>
-          </p:cNvSpPr>
-          <p:nvPr>
-            <p:ph type="hdr"/>
-          </p:nvPr>
-        </p:nvSpPr>
-        <p:spPr>
-          <a:xfrm>
-            <a:off x="0" y="0"/>
-            <a:ext cx="3280680" cy="534240"/>
-          </a:xfrm>
-          <a:prstGeom prst="rect">
-            <a:avLst/>
-          </a:prstGeom>
-        </p:spPr>
-        <p:txBody>
-          <a:bodyPr lIns="0" rIns="0" tIns="0" bIns="0"/>
-          <a:p>
-            <a:r>
-              <a:rPr lang="en-US" sz="1400">
-                <a:latin typeface="Times New Roman"/>
-              </a:rPr>
-              <a:t>&lt;header&gt;</a:t>
-            </a:r>
-            <a:endParaRPr/>
-          </a:p>
-        </p:txBody>
-      </p:sp>
-      <p:sp>
-        <p:nvSpPr>
-          <p:cNvPr id="41" name="PlaceHolder 3"/>
-          <p:cNvSpPr>
-            <a:spLocks noGrp="1"/>
-          </p:cNvSpPr>
-          <p:nvPr>
-            <p:ph type="dt"/>
-          </p:nvPr>
-        </p:nvSpPr>
-        <p:spPr>
-          <a:xfrm>
-            <a:off x="4278960" y="0"/>
-            <a:ext cx="3280680" cy="534240"/>
-          </a:xfrm>
-          <a:prstGeom prst="rect">
-            <a:avLst/>
-          </a:prstGeom>
-        </p:spPr>
-        <p:txBody>
-          <a:bodyPr lIns="0" rIns="0" tIns="0" bIns="0"/>
-          <a:p>
-            <a:pPr algn="r"/>
-            <a:r>
-              <a:rPr lang="en-US" sz="1400">
-                <a:latin typeface="Times New Roman"/>
-              </a:rPr>
-              <a:t>&lt;date/time&gt;</a:t>
-            </a:r>
-            <a:endParaRPr/>
-          </a:p>
-        </p:txBody>
-      </p:sp>
-      <p:sp>
-        <p:nvSpPr>
-          <p:cNvPr id="42" name="PlaceHolder 4"/>
-          <p:cNvSpPr>
-            <a:spLocks noGrp="1"/>
-          </p:cNvSpPr>
-          <p:nvPr>
-            <p:ph type="ftr"/>
-          </p:nvPr>
-        </p:nvSpPr>
-        <p:spPr>
-          <a:xfrm>
-            <a:off x="0" y="10157400"/>
-            <a:ext cx="3280680" cy="534240"/>
-          </a:xfrm>
-          <a:prstGeom prst="rect">
-            <a:avLst/>
-          </a:prstGeom>
-        </p:spPr>
-        <p:txBody>
-          <a:bodyPr lIns="0" rIns="0" tIns="0" bIns="0" anchor="b"/>
-          <a:p>
-            <a:r>
-              <a:rPr lang="en-US" sz="1400">
-                <a:latin typeface="Times New Roman"/>
-              </a:rPr>
-              <a:t>&lt;footer&gt;</a:t>
-            </a:r>
-            <a:endParaRPr/>
-          </a:p>
-        </p:txBody>
-      </p:sp>
-      <p:sp>
-        <p:nvSpPr>
-          <p:cNvPr id="43" name="PlaceHolder 5"/>
-          <p:cNvSpPr>
-            <a:spLocks noGrp="1"/>
-          </p:cNvSpPr>
-          <p:nvPr>
-            <p:ph type="sldNum"/>
-          </p:nvPr>
-        </p:nvSpPr>
-        <p:spPr>
-          <a:xfrm>
-            <a:off x="4278960" y="10157400"/>
-            <a:ext cx="3280680" cy="534240"/>
-          </a:xfrm>
-          <a:prstGeom prst="rect">
-            <a:avLst/>
-          </a:prstGeom>
-        </p:spPr>
-        <p:txBody>
-          <a:bodyPr lIns="0" rIns="0" tIns="0" bIns="0" anchor="b"/>
-          <a:p>
-            <a:pPr algn="r"/>
-            <a:fld id="{D3B44ACD-2815-496E-B1A3-E0BF2B9F978C}" type="slidenum">
-              <a:rPr lang="en-US" sz="1400">
-                <a:latin typeface="Times New Roman"/>
-              </a:rPr>
-              <a:t>&lt;number&gt;</a:t>
-            </a:fld>
+            <a:off x="709920" y="4861440"/>
+            <a:ext cx="5679000" cy="4605480"/>
+          </a:xfrm>
+          <a:prstGeom prst="rect">
+            <a:avLst/>
+          </a:prstGeom>
+        </p:spPr>
+        <p:txBody>
+          <a:bodyPr lIns="0" tIns="0" rIns="0" bIns="0"/>
+          <a:lstStyle/>
+          <a:p>
             <a:endParaRPr/>
           </a:p>
         </p:txBody>
       </p:sp>
     </p:spTree>
   </p:cSld>
-  <p:clrMap bg1="lt1" bg2="lt2" tx1="dk1" tx2="dk2" accent1="accent1" accent2="accent2" accent3="accent3" accent4="accent4" accent5="accent5" accent6="accent6" hlink="hlink" folHlink="folHlink"/>
-</p:notesMaster>
+  <p:clrMapOvr>
+    <a:masterClrMapping/>
+  </p:clrMapOvr>
+</p:notes>
 </file>
 
-<file path=ppt/notesSlides/notesSlide1.xml><?xml version="1.0" encoding="utf-8"?>
-<p:notes xmlns:a="http://schemas.openxmlformats.org/drawingml/2006/main" xmlns:p="http://schemas.openxmlformats.org/presentationml/2006/main" xmlns:r="http://schemas.openxmlformats.org/officeDocument/2006/relationships">
+<file path=ppt/notesSlides/notesSlide2.xml><?xml version="1.0" encoding="utf-8"?>
+<p:notes xmlns:a="http://schemas.openxmlformats.org/drawingml/2006/main" xmlns:r="http://schemas.openxmlformats.org/officeDocument/2006/relationships" xmlns:p="http://schemas.openxmlformats.org/presentationml/2006/main">
   <p:cSld>
     <p:spTree>
       <p:nvGrpSpPr>
@@ -222,7 +506,7 @@
       </p:grpSpPr>
       <p:sp>
         <p:nvSpPr>
-          <p:cNvPr id="71" name="TextShape 1"/>
+          <p:cNvPr id="73" name="TextShape 1"/>
           <p:cNvSpPr txBox="1"/>
           <p:nvPr/>
         </p:nvSpPr>
@@ -236,19 +520,20 @@
           </a:prstGeom>
         </p:spPr>
         <p:txBody>
-          <a:bodyPr lIns="0" rIns="0" tIns="0" bIns="0" anchor="b"/>
+          <a:bodyPr lIns="0" tIns="0" rIns="0" bIns="0" anchor="b"/>
+          <a:lstStyle/>
           <a:p>
             <a:pPr>
               <a:lnSpc>
                 <a:spcPct val="100000"/>
               </a:lnSpc>
             </a:pPr>
-            <a:fld id="{08F925C0-2300-4A1C-B7B6-EACF11700DF9}" type="slidenum">
+            <a:fld id="{D40DECB4-4688-4276-B7BC-8B8F39B912DA}" type="slidenum">
               <a:rPr lang="en-US" sz="1300">
                 <a:latin typeface="Times New Roman"/>
                 <a:ea typeface="Arial Unicode MS"/>
               </a:rPr>
-              <a:t>&lt;number&gt;</a:t>
+              <a:t>2</a:t>
             </a:fld>
             <a:endParaRPr/>
           </a:p>
@@ -256,7 +541,7 @@
       </p:sp>
       <p:sp>
         <p:nvSpPr>
-          <p:cNvPr id="72" name="PlaceHolder 2"/>
+          <p:cNvPr id="74" name="PlaceHolder 2"/>
           <p:cNvSpPr>
             <a:spLocks noGrp="1"/>
           </p:cNvSpPr>
@@ -267,14 +552,15 @@
         <p:spPr>
           <a:xfrm>
             <a:off x="709920" y="4861440"/>
-            <a:ext cx="5679000" cy="4605480"/>
-          </a:xfrm>
-          <a:prstGeom prst="rect">
-            <a:avLst/>
-          </a:prstGeom>
-        </p:spPr>
-        <p:txBody>
-          <a:bodyPr lIns="0" rIns="0" tIns="0" bIns="0"/>
+            <a:ext cx="5679000" cy="4605120"/>
+          </a:xfrm>
+          <a:prstGeom prst="rect">
+            <a:avLst/>
+          </a:prstGeom>
+        </p:spPr>
+        <p:txBody>
+          <a:bodyPr lIns="0" tIns="0" rIns="0" bIns="0"/>
+          <a:lstStyle/>
           <a:p>
             <a:endParaRPr/>
           </a:p>
@@ -282,11 +568,14 @@
       </p:sp>
     </p:spTree>
   </p:cSld>
+  <p:clrMapOvr>
+    <a:masterClrMapping/>
+  </p:clrMapOvr>
 </p:notes>
 </file>
 
-<file path=ppt/notesSlides/notesSlide2.xml><?xml version="1.0" encoding="utf-8"?>
-<p:notes xmlns:a="http://schemas.openxmlformats.org/drawingml/2006/main" xmlns:p="http://schemas.openxmlformats.org/presentationml/2006/main" xmlns:r="http://schemas.openxmlformats.org/officeDocument/2006/relationships">
+<file path=ppt/notesSlides/notesSlide3.xml><?xml version="1.0" encoding="utf-8"?>
+<p:notes xmlns:a="http://schemas.openxmlformats.org/drawingml/2006/main" xmlns:r="http://schemas.openxmlformats.org/officeDocument/2006/relationships" xmlns:p="http://schemas.openxmlformats.org/presentationml/2006/main">
   <p:cSld>
     <p:spTree>
       <p:nvGrpSpPr>
@@ -304,7 +593,7 @@
       </p:grpSpPr>
       <p:sp>
         <p:nvSpPr>
-          <p:cNvPr id="73" name="TextShape 1"/>
+          <p:cNvPr id="75" name="TextShape 1"/>
           <p:cNvSpPr txBox="1"/>
           <p:nvPr/>
         </p:nvSpPr>
@@ -318,19 +607,20 @@
           </a:prstGeom>
         </p:spPr>
         <p:txBody>
-          <a:bodyPr lIns="0" rIns="0" tIns="0" bIns="0" anchor="b"/>
+          <a:bodyPr lIns="0" tIns="0" rIns="0" bIns="0" anchor="b"/>
+          <a:lstStyle/>
           <a:p>
             <a:pPr>
               <a:lnSpc>
                 <a:spcPct val="100000"/>
               </a:lnSpc>
             </a:pPr>
-            <a:fld id="{D40DECB4-4688-4276-B7BC-8B8F39B912DA}" type="slidenum">
+            <a:fld id="{56850BB7-EC53-4D30-91C4-8A45A2A0C6F7}" type="slidenum">
               <a:rPr lang="en-US" sz="1300">
                 <a:latin typeface="Times New Roman"/>
                 <a:ea typeface="Arial Unicode MS"/>
               </a:rPr>
-              <a:t>&lt;number&gt;</a:t>
+              <a:t>3</a:t>
             </a:fld>
             <a:endParaRPr/>
           </a:p>
@@ -338,7 +628,7 @@
       </p:sp>
       <p:sp>
         <p:nvSpPr>
-          <p:cNvPr id="74" name="PlaceHolder 2"/>
+          <p:cNvPr id="76" name="PlaceHolder 2"/>
           <p:cNvSpPr>
             <a:spLocks noGrp="1"/>
           </p:cNvSpPr>
@@ -356,7 +646,8 @@
           </a:prstGeom>
         </p:spPr>
         <p:txBody>
-          <a:bodyPr lIns="0" rIns="0" tIns="0" bIns="0"/>
+          <a:bodyPr lIns="0" tIns="0" rIns="0" bIns="0"/>
+          <a:lstStyle/>
           <a:p>
             <a:endParaRPr/>
           </a:p>
@@ -364,11 +655,14 @@
       </p:sp>
     </p:spTree>
   </p:cSld>
+  <p:clrMapOvr>
+    <a:masterClrMapping/>
+  </p:clrMapOvr>
 </p:notes>
 </file>
 
-<file path=ppt/notesSlides/notesSlide3.xml><?xml version="1.0" encoding="utf-8"?>
-<p:notes xmlns:a="http://schemas.openxmlformats.org/drawingml/2006/main" xmlns:p="http://schemas.openxmlformats.org/presentationml/2006/main" xmlns:r="http://schemas.openxmlformats.org/officeDocument/2006/relationships">
+<file path=ppt/notesSlides/notesSlide4.xml><?xml version="1.0" encoding="utf-8"?>
+<p:notes xmlns:a="http://schemas.openxmlformats.org/drawingml/2006/main" xmlns:r="http://schemas.openxmlformats.org/officeDocument/2006/relationships" xmlns:p="http://schemas.openxmlformats.org/presentationml/2006/main">
   <p:cSld>
     <p:spTree>
       <p:nvGrpSpPr>
@@ -386,88 +680,6 @@
       </p:grpSpPr>
       <p:sp>
         <p:nvSpPr>
-          <p:cNvPr id="75" name="TextShape 1"/>
-          <p:cNvSpPr txBox="1"/>
-          <p:nvPr/>
-        </p:nvSpPr>
-        <p:spPr>
-          <a:xfrm>
-            <a:off x="4018320" y="9722880"/>
-            <a:ext cx="3080520" cy="511200"/>
-          </a:xfrm>
-          <a:prstGeom prst="rect">
-            <a:avLst/>
-          </a:prstGeom>
-        </p:spPr>
-        <p:txBody>
-          <a:bodyPr lIns="0" rIns="0" tIns="0" bIns="0" anchor="b"/>
-          <a:p>
-            <a:pPr>
-              <a:lnSpc>
-                <a:spcPct val="100000"/>
-              </a:lnSpc>
-            </a:pPr>
-            <a:fld id="{56850BB7-EC53-4D30-91C4-8A45A2A0C6F7}" type="slidenum">
-              <a:rPr lang="en-US" sz="1300">
-                <a:latin typeface="Times New Roman"/>
-                <a:ea typeface="Arial Unicode MS"/>
-              </a:rPr>
-              <a:t>&lt;number&gt;</a:t>
-            </a:fld>
-            <a:endParaRPr/>
-          </a:p>
-        </p:txBody>
-      </p:sp>
-      <p:sp>
-        <p:nvSpPr>
-          <p:cNvPr id="76" name="PlaceHolder 2"/>
-          <p:cNvSpPr>
-            <a:spLocks noGrp="1"/>
-          </p:cNvSpPr>
-          <p:nvPr>
-            <p:ph type="body"/>
-          </p:nvPr>
-        </p:nvSpPr>
-        <p:spPr>
-          <a:xfrm>
-            <a:off x="709920" y="4861440"/>
-            <a:ext cx="5679000" cy="4605120"/>
-          </a:xfrm>
-          <a:prstGeom prst="rect">
-            <a:avLst/>
-          </a:prstGeom>
-        </p:spPr>
-        <p:txBody>
-          <a:bodyPr lIns="0" rIns="0" tIns="0" bIns="0"/>
-          <a:p>
-            <a:endParaRPr/>
-          </a:p>
-        </p:txBody>
-      </p:sp>
-    </p:spTree>
-  </p:cSld>
-</p:notes>
-</file>
-
-<file path=ppt/notesSlides/notesSlide4.xml><?xml version="1.0" encoding="utf-8"?>
-<p:notes xmlns:a="http://schemas.openxmlformats.org/drawingml/2006/main" xmlns:p="http://schemas.openxmlformats.org/presentationml/2006/main" xmlns:r="http://schemas.openxmlformats.org/officeDocument/2006/relationships">
-  <p:cSld>
-    <p:spTree>
-      <p:nvGrpSpPr>
-        <p:cNvPr id="1" name=""/>
-        <p:cNvGrpSpPr/>
-        <p:nvPr/>
-      </p:nvGrpSpPr>
-      <p:grpSpPr>
-        <a:xfrm>
-          <a:off x="0" y="0"/>
-          <a:ext cx="0" cy="0"/>
-          <a:chOff x="0" y="0"/>
-          <a:chExt cx="0" cy="0"/>
-        </a:xfrm>
-      </p:grpSpPr>
-      <p:sp>
-        <p:nvSpPr>
           <p:cNvPr id="77" name="TextShape 1"/>
           <p:cNvSpPr txBox="1"/>
           <p:nvPr/>
@@ -482,7 +694,8 @@
           </a:prstGeom>
         </p:spPr>
         <p:txBody>
-          <a:bodyPr lIns="0" rIns="0" tIns="0" bIns="0" anchor="b"/>
+          <a:bodyPr lIns="0" tIns="0" rIns="0" bIns="0" anchor="b"/>
+          <a:lstStyle/>
           <a:p>
             <a:pPr>
               <a:lnSpc>
@@ -494,7 +707,7 @@
                 <a:latin typeface="Times New Roman"/>
                 <a:ea typeface="Arial Unicode MS"/>
               </a:rPr>
-              <a:t>&lt;number&gt;</a:t>
+              <a:t>4</a:t>
             </a:fld>
             <a:endParaRPr/>
           </a:p>
@@ -520,7 +733,8 @@
           </a:prstGeom>
         </p:spPr>
         <p:txBody>
-          <a:bodyPr lIns="0" rIns="0" tIns="0" bIns="0"/>
+          <a:bodyPr lIns="0" tIns="0" rIns="0" bIns="0"/>
+          <a:lstStyle/>
           <a:p>
             <a:endParaRPr/>
           </a:p>
@@ -528,11 +742,14 @@
       </p:sp>
     </p:spTree>
   </p:cSld>
+  <p:clrMapOvr>
+    <a:masterClrMapping/>
+  </p:clrMapOvr>
 </p:notes>
 </file>
 
 <file path=ppt/slideLayouts/slideLayout1.xml><?xml version="1.0" encoding="utf-8"?>
-<p:sldLayout xmlns:a="http://schemas.openxmlformats.org/drawingml/2006/main" xmlns:p="http://schemas.openxmlformats.org/presentationml/2006/main" xmlns:r="http://schemas.openxmlformats.org/officeDocument/2006/relationships" type="blank" preserve="1">
+<p:sldLayout xmlns:a="http://schemas.openxmlformats.org/drawingml/2006/main" xmlns:r="http://schemas.openxmlformats.org/officeDocument/2006/relationships" xmlns:p="http://schemas.openxmlformats.org/presentationml/2006/main" type="blank" preserve="1">
   <p:cSld name="Blank Slide">
     <p:spTree>
       <p:nvGrpSpPr>
@@ -550,11 +767,14 @@
       </p:grpSpPr>
     </p:spTree>
   </p:cSld>
+  <p:clrMapOvr>
+    <a:masterClrMapping/>
+  </p:clrMapOvr>
 </p:sldLayout>
 </file>
 
 <file path=ppt/slideLayouts/slideLayout10.xml><?xml version="1.0" encoding="utf-8"?>
-<p:sldLayout xmlns:a="http://schemas.openxmlformats.org/drawingml/2006/main" xmlns:p="http://schemas.openxmlformats.org/presentationml/2006/main" xmlns:r="http://schemas.openxmlformats.org/officeDocument/2006/relationships" type="objOverTx" preserve="1">
+<p:sldLayout xmlns:a="http://schemas.openxmlformats.org/drawingml/2006/main" xmlns:r="http://schemas.openxmlformats.org/officeDocument/2006/relationships" xmlns:p="http://schemas.openxmlformats.org/presentationml/2006/main" type="objOverTx" preserve="1">
   <p:cSld name="Title, Content over Content">
     <p:spTree>
       <p:nvGrpSpPr>
@@ -590,7 +810,8 @@
           </a:prstGeom>
         </p:spPr>
         <p:txBody>
-          <a:bodyPr lIns="0" rIns="0" tIns="0" bIns="0" anchor="ctr"/>
+          <a:bodyPr lIns="0" tIns="0" rIns="0" bIns="0" anchor="ctr"/>
+          <a:lstStyle/>
           <a:p>
             <a:endParaRPr/>
           </a:p>
@@ -616,7 +837,8 @@
           </a:prstGeom>
         </p:spPr>
         <p:txBody>
-          <a:bodyPr lIns="0" rIns="0" tIns="0" bIns="0"/>
+          <a:bodyPr lIns="0" tIns="0" rIns="0" bIns="0"/>
+          <a:lstStyle/>
           <a:p>
             <a:endParaRPr/>
           </a:p>
@@ -642,7 +864,8 @@
           </a:prstGeom>
         </p:spPr>
         <p:txBody>
-          <a:bodyPr lIns="0" rIns="0" tIns="0" bIns="0"/>
+          <a:bodyPr lIns="0" tIns="0" rIns="0" bIns="0"/>
+          <a:lstStyle/>
           <a:p>
             <a:endParaRPr/>
           </a:p>
@@ -650,11 +873,14 @@
       </p:sp>
     </p:spTree>
   </p:cSld>
+  <p:clrMapOvr>
+    <a:masterClrMapping/>
+  </p:clrMapOvr>
 </p:sldLayout>
 </file>
 
 <file path=ppt/slideLayouts/slideLayout11.xml><?xml version="1.0" encoding="utf-8"?>
-<p:sldLayout xmlns:a="http://schemas.openxmlformats.org/drawingml/2006/main" xmlns:p="http://schemas.openxmlformats.org/presentationml/2006/main" xmlns:r="http://schemas.openxmlformats.org/officeDocument/2006/relationships" type="fourObj" preserve="1">
+<p:sldLayout xmlns:a="http://schemas.openxmlformats.org/drawingml/2006/main" xmlns:r="http://schemas.openxmlformats.org/officeDocument/2006/relationships" xmlns:p="http://schemas.openxmlformats.org/presentationml/2006/main" type="fourObj" preserve="1">
   <p:cSld name="Title, 4 Content">
     <p:spTree>
       <p:nvGrpSpPr>
@@ -690,7 +916,8 @@
           </a:prstGeom>
         </p:spPr>
         <p:txBody>
-          <a:bodyPr lIns="0" rIns="0" tIns="0" bIns="0" anchor="ctr"/>
+          <a:bodyPr lIns="0" tIns="0" rIns="0" bIns="0" anchor="ctr"/>
+          <a:lstStyle/>
           <a:p>
             <a:endParaRPr/>
           </a:p>
@@ -716,7 +943,8 @@
           </a:prstGeom>
         </p:spPr>
         <p:txBody>
-          <a:bodyPr lIns="0" rIns="0" tIns="0" bIns="0"/>
+          <a:bodyPr lIns="0" tIns="0" rIns="0" bIns="0"/>
+          <a:lstStyle/>
           <a:p>
             <a:endParaRPr/>
           </a:p>
@@ -742,7 +970,8 @@
           </a:prstGeom>
         </p:spPr>
         <p:txBody>
-          <a:bodyPr lIns="0" rIns="0" tIns="0" bIns="0"/>
+          <a:bodyPr lIns="0" tIns="0" rIns="0" bIns="0"/>
+          <a:lstStyle/>
           <a:p>
             <a:endParaRPr/>
           </a:p>
@@ -768,7 +997,8 @@
           </a:prstGeom>
         </p:spPr>
         <p:txBody>
-          <a:bodyPr lIns="0" rIns="0" tIns="0" bIns="0"/>
+          <a:bodyPr lIns="0" tIns="0" rIns="0" bIns="0"/>
+          <a:lstStyle/>
           <a:p>
             <a:endParaRPr/>
           </a:p>
@@ -794,7 +1024,8 @@
           </a:prstGeom>
         </p:spPr>
         <p:txBody>
-          <a:bodyPr lIns="0" rIns="0" tIns="0" bIns="0"/>
+          <a:bodyPr lIns="0" tIns="0" rIns="0" bIns="0"/>
+          <a:lstStyle/>
           <a:p>
             <a:endParaRPr/>
           </a:p>
@@ -802,11 +1033,14 @@
       </p:sp>
     </p:spTree>
   </p:cSld>
+  <p:clrMapOvr>
+    <a:masterClrMapping/>
+  </p:clrMapOvr>
 </p:sldLayout>
 </file>
 
 <file path=ppt/slideLayouts/slideLayout12.xml><?xml version="1.0" encoding="utf-8"?>
-<p:sldLayout xmlns:a="http://schemas.openxmlformats.org/drawingml/2006/main" xmlns:p="http://schemas.openxmlformats.org/presentationml/2006/main" xmlns:r="http://schemas.openxmlformats.org/officeDocument/2006/relationships" type="blank" preserve="1">
+<p:sldLayout xmlns:a="http://schemas.openxmlformats.org/drawingml/2006/main" xmlns:r="http://schemas.openxmlformats.org/officeDocument/2006/relationships" xmlns:p="http://schemas.openxmlformats.org/presentationml/2006/main" type="blank" preserve="1">
   <p:cSld name="Title, 6 Content">
     <p:spTree>
       <p:nvGrpSpPr>
@@ -842,7 +1076,8 @@
           </a:prstGeom>
         </p:spPr>
         <p:txBody>
-          <a:bodyPr lIns="0" rIns="0" tIns="0" bIns="0" anchor="ctr"/>
+          <a:bodyPr lIns="0" tIns="0" rIns="0" bIns="0" anchor="ctr"/>
+          <a:lstStyle/>
           <a:p>
             <a:endParaRPr/>
           </a:p>
@@ -868,7 +1103,8 @@
           </a:prstGeom>
         </p:spPr>
         <p:txBody>
-          <a:bodyPr lIns="0" rIns="0" tIns="0" bIns="0"/>
+          <a:bodyPr lIns="0" tIns="0" rIns="0" bIns="0"/>
+          <a:lstStyle/>
           <a:p>
             <a:endParaRPr/>
           </a:p>
@@ -894,7 +1130,8 @@
           </a:prstGeom>
         </p:spPr>
         <p:txBody>
-          <a:bodyPr lIns="0" rIns="0" tIns="0" bIns="0"/>
+          <a:bodyPr lIns="0" tIns="0" rIns="0" bIns="0"/>
+          <a:lstStyle/>
           <a:p>
             <a:endParaRPr/>
           </a:p>
@@ -902,7 +1139,7 @@
       </p:sp>
       <p:pic>
         <p:nvPicPr>
-          <p:cNvPr id="37" name="" descr=""/>
+          <p:cNvPr id="37" name="Picture 36"/>
           <p:cNvPicPr/>
           <p:nvPr/>
         </p:nvPicPr>
@@ -927,12 +1164,12 @@
       </p:pic>
       <p:pic>
         <p:nvPicPr>
-          <p:cNvPr id="38" name="" descr=""/>
+          <p:cNvPr id="38" name="Picture 37"/>
           <p:cNvPicPr/>
           <p:nvPr/>
         </p:nvPicPr>
         <p:blipFill>
-          <a:blip r:embed="rId3"/>
+          <a:blip r:embed="rId2"/>
           <a:stretch>
             <a:fillRect/>
           </a:stretch>
@@ -952,11 +1189,14 @@
       </p:pic>
     </p:spTree>
   </p:cSld>
+  <p:clrMapOvr>
+    <a:masterClrMapping/>
+  </p:clrMapOvr>
 </p:sldLayout>
 </file>
 
 <file path=ppt/slideLayouts/slideLayout2.xml><?xml version="1.0" encoding="utf-8"?>
-<p:sldLayout xmlns:a="http://schemas.openxmlformats.org/drawingml/2006/main" xmlns:p="http://schemas.openxmlformats.org/presentationml/2006/main" xmlns:r="http://schemas.openxmlformats.org/officeDocument/2006/relationships" type="tx" preserve="1">
+<p:sldLayout xmlns:a="http://schemas.openxmlformats.org/drawingml/2006/main" xmlns:r="http://schemas.openxmlformats.org/officeDocument/2006/relationships" xmlns:p="http://schemas.openxmlformats.org/presentationml/2006/main" type="tx" preserve="1">
   <p:cSld name="Title Slide">
     <p:spTree>
       <p:nvGrpSpPr>
@@ -992,7 +1232,8 @@
           </a:prstGeom>
         </p:spPr>
         <p:txBody>
-          <a:bodyPr lIns="0" rIns="0" tIns="0" bIns="0" anchor="ctr"/>
+          <a:bodyPr lIns="0" tIns="0" rIns="0" bIns="0" anchor="ctr"/>
+          <a:lstStyle/>
           <a:p>
             <a:endParaRPr/>
           </a:p>
@@ -1018,7 +1259,8 @@
           </a:prstGeom>
         </p:spPr>
         <p:txBody>
-          <a:bodyPr lIns="0" rIns="0" tIns="0" bIns="0" anchor="ctr"/>
+          <a:bodyPr lIns="0" tIns="0" rIns="0" bIns="0" anchor="ctr"/>
+          <a:lstStyle/>
           <a:p>
             <a:pPr algn="ctr"/>
             <a:endParaRPr/>
@@ -1027,11 +1269,14 @@
       </p:sp>
     </p:spTree>
   </p:cSld>
+  <p:clrMapOvr>
+    <a:masterClrMapping/>
+  </p:clrMapOvr>
 </p:sldLayout>
 </file>
 
 <file path=ppt/slideLayouts/slideLayout3.xml><?xml version="1.0" encoding="utf-8"?>
-<p:sldLayout xmlns:a="http://schemas.openxmlformats.org/drawingml/2006/main" xmlns:p="http://schemas.openxmlformats.org/presentationml/2006/main" xmlns:r="http://schemas.openxmlformats.org/officeDocument/2006/relationships" type="obj" preserve="1">
+<p:sldLayout xmlns:a="http://schemas.openxmlformats.org/drawingml/2006/main" xmlns:r="http://schemas.openxmlformats.org/officeDocument/2006/relationships" xmlns:p="http://schemas.openxmlformats.org/presentationml/2006/main" type="obj" preserve="1">
   <p:cSld name="Title, Content">
     <p:spTree>
       <p:nvGrpSpPr>
@@ -1067,7 +1312,8 @@
           </a:prstGeom>
         </p:spPr>
         <p:txBody>
-          <a:bodyPr lIns="0" rIns="0" tIns="0" bIns="0" anchor="ctr"/>
+          <a:bodyPr lIns="0" tIns="0" rIns="0" bIns="0" anchor="ctr"/>
+          <a:lstStyle/>
           <a:p>
             <a:endParaRPr/>
           </a:p>
@@ -1093,7 +1339,8 @@
           </a:prstGeom>
         </p:spPr>
         <p:txBody>
-          <a:bodyPr lIns="0" rIns="0" tIns="0" bIns="0"/>
+          <a:bodyPr lIns="0" tIns="0" rIns="0" bIns="0"/>
+          <a:lstStyle/>
           <a:p>
             <a:endParaRPr/>
           </a:p>
@@ -1101,11 +1348,14 @@
       </p:sp>
     </p:spTree>
   </p:cSld>
+  <p:clrMapOvr>
+    <a:masterClrMapping/>
+  </p:clrMapOvr>
 </p:sldLayout>
 </file>
 
 <file path=ppt/slideLayouts/slideLayout4.xml><?xml version="1.0" encoding="utf-8"?>
-<p:sldLayout xmlns:a="http://schemas.openxmlformats.org/drawingml/2006/main" xmlns:p="http://schemas.openxmlformats.org/presentationml/2006/main" xmlns:r="http://schemas.openxmlformats.org/officeDocument/2006/relationships" type="twoObj" preserve="1">
+<p:sldLayout xmlns:a="http://schemas.openxmlformats.org/drawingml/2006/main" xmlns:r="http://schemas.openxmlformats.org/officeDocument/2006/relationships" xmlns:p="http://schemas.openxmlformats.org/presentationml/2006/main" type="twoObj" preserve="1">
   <p:cSld name="Title, 2 Content">
     <p:spTree>
       <p:nvGrpSpPr>
@@ -1141,7 +1391,8 @@
           </a:prstGeom>
         </p:spPr>
         <p:txBody>
-          <a:bodyPr lIns="0" rIns="0" tIns="0" bIns="0" anchor="ctr"/>
+          <a:bodyPr lIns="0" tIns="0" rIns="0" bIns="0" anchor="ctr"/>
+          <a:lstStyle/>
           <a:p>
             <a:endParaRPr/>
           </a:p>
@@ -1167,7 +1418,8 @@
           </a:prstGeom>
         </p:spPr>
         <p:txBody>
-          <a:bodyPr lIns="0" rIns="0" tIns="0" bIns="0"/>
+          <a:bodyPr lIns="0" tIns="0" rIns="0" bIns="0"/>
+          <a:lstStyle/>
           <a:p>
             <a:endParaRPr/>
           </a:p>
@@ -1193,7 +1445,8 @@
           </a:prstGeom>
         </p:spPr>
         <p:txBody>
-          <a:bodyPr lIns="0" rIns="0" tIns="0" bIns="0"/>
+          <a:bodyPr lIns="0" tIns="0" rIns="0" bIns="0"/>
+          <a:lstStyle/>
           <a:p>
             <a:endParaRPr/>
           </a:p>
@@ -1201,11 +1454,14 @@
       </p:sp>
     </p:spTree>
   </p:cSld>
+  <p:clrMapOvr>
+    <a:masterClrMapping/>
+  </p:clrMapOvr>
 </p:sldLayout>
 </file>
 
 <file path=ppt/slideLayouts/slideLayout5.xml><?xml version="1.0" encoding="utf-8"?>
-<p:sldLayout xmlns:a="http://schemas.openxmlformats.org/drawingml/2006/main" xmlns:p="http://schemas.openxmlformats.org/presentationml/2006/main" xmlns:r="http://schemas.openxmlformats.org/officeDocument/2006/relationships" type="titleOnly" preserve="1">
+<p:sldLayout xmlns:a="http://schemas.openxmlformats.org/drawingml/2006/main" xmlns:r="http://schemas.openxmlformats.org/officeDocument/2006/relationships" xmlns:p="http://schemas.openxmlformats.org/presentationml/2006/main" type="titleOnly" preserve="1">
   <p:cSld name="Title Only">
     <p:spTree>
       <p:nvGrpSpPr>
@@ -1241,7 +1497,8 @@
           </a:prstGeom>
         </p:spPr>
         <p:txBody>
-          <a:bodyPr lIns="0" rIns="0" tIns="0" bIns="0" anchor="ctr"/>
+          <a:bodyPr lIns="0" tIns="0" rIns="0" bIns="0" anchor="ctr"/>
+          <a:lstStyle/>
           <a:p>
             <a:endParaRPr/>
           </a:p>
@@ -1249,11 +1506,14 @@
       </p:sp>
     </p:spTree>
   </p:cSld>
+  <p:clrMapOvr>
+    <a:masterClrMapping/>
+  </p:clrMapOvr>
 </p:sldLayout>
 </file>
 
 <file path=ppt/slideLayouts/slideLayout6.xml><?xml version="1.0" encoding="utf-8"?>
-<p:sldLayout xmlns:a="http://schemas.openxmlformats.org/drawingml/2006/main" xmlns:p="http://schemas.openxmlformats.org/presentationml/2006/main" xmlns:r="http://schemas.openxmlformats.org/officeDocument/2006/relationships" type="objOnly" preserve="1">
+<p:sldLayout xmlns:a="http://schemas.openxmlformats.org/drawingml/2006/main" xmlns:r="http://schemas.openxmlformats.org/officeDocument/2006/relationships" xmlns:p="http://schemas.openxmlformats.org/presentationml/2006/main" type="objOnly" preserve="1">
   <p:cSld name="Centered Text">
     <p:spTree>
       <p:nvGrpSpPr>
@@ -1289,7 +1549,8 @@
           </a:prstGeom>
         </p:spPr>
         <p:txBody>
-          <a:bodyPr lIns="0" rIns="0" tIns="0" bIns="0" anchor="ctr"/>
+          <a:bodyPr lIns="0" tIns="0" rIns="0" bIns="0" anchor="ctr"/>
+          <a:lstStyle/>
           <a:p>
             <a:pPr algn="ctr"/>
             <a:endParaRPr/>
@@ -1298,11 +1559,14 @@
       </p:sp>
     </p:spTree>
   </p:cSld>
+  <p:clrMapOvr>
+    <a:masterClrMapping/>
+  </p:clrMapOvr>
 </p:sldLayout>
 </file>
 
 <file path=ppt/slideLayouts/slideLayout7.xml><?xml version="1.0" encoding="utf-8"?>
-<p:sldLayout xmlns:a="http://schemas.openxmlformats.org/drawingml/2006/main" xmlns:p="http://schemas.openxmlformats.org/presentationml/2006/main" xmlns:r="http://schemas.openxmlformats.org/officeDocument/2006/relationships" type="twoObjAndObj" preserve="1">
+<p:sldLayout xmlns:a="http://schemas.openxmlformats.org/drawingml/2006/main" xmlns:r="http://schemas.openxmlformats.org/officeDocument/2006/relationships" xmlns:p="http://schemas.openxmlformats.org/presentationml/2006/main" type="twoObjAndObj" preserve="1">
   <p:cSld name="Title, 2 Content and Content">
     <p:spTree>
       <p:nvGrpSpPr>
@@ -1338,7 +1602,8 @@
           </a:prstGeom>
         </p:spPr>
         <p:txBody>
-          <a:bodyPr lIns="0" rIns="0" tIns="0" bIns="0" anchor="ctr"/>
+          <a:bodyPr lIns="0" tIns="0" rIns="0" bIns="0" anchor="ctr"/>
+          <a:lstStyle/>
           <a:p>
             <a:endParaRPr/>
           </a:p>
@@ -1364,7 +1629,8 @@
           </a:prstGeom>
         </p:spPr>
         <p:txBody>
-          <a:bodyPr lIns="0" rIns="0" tIns="0" bIns="0"/>
+          <a:bodyPr lIns="0" tIns="0" rIns="0" bIns="0"/>
+          <a:lstStyle/>
           <a:p>
             <a:endParaRPr/>
           </a:p>
@@ -1390,7 +1656,8 @@
           </a:prstGeom>
         </p:spPr>
         <p:txBody>
-          <a:bodyPr lIns="0" rIns="0" tIns="0" bIns="0"/>
+          <a:bodyPr lIns="0" tIns="0" rIns="0" bIns="0"/>
+          <a:lstStyle/>
           <a:p>
             <a:endParaRPr/>
           </a:p>
@@ -1416,7 +1683,8 @@
           </a:prstGeom>
         </p:spPr>
         <p:txBody>
-          <a:bodyPr lIns="0" rIns="0" tIns="0" bIns="0"/>
+          <a:bodyPr lIns="0" tIns="0" rIns="0" bIns="0"/>
+          <a:lstStyle/>
           <a:p>
             <a:endParaRPr/>
           </a:p>
@@ -1424,11 +1692,14 @@
       </p:sp>
     </p:spTree>
   </p:cSld>
+  <p:clrMapOvr>
+    <a:masterClrMapping/>
+  </p:clrMapOvr>
 </p:sldLayout>
 </file>
 
 <file path=ppt/slideLayouts/slideLayout8.xml><?xml version="1.0" encoding="utf-8"?>
-<p:sldLayout xmlns:a="http://schemas.openxmlformats.org/drawingml/2006/main" xmlns:p="http://schemas.openxmlformats.org/presentationml/2006/main" xmlns:r="http://schemas.openxmlformats.org/officeDocument/2006/relationships" type="objAndTwoObj" preserve="1">
+<p:sldLayout xmlns:a="http://schemas.openxmlformats.org/drawingml/2006/main" xmlns:r="http://schemas.openxmlformats.org/officeDocument/2006/relationships" xmlns:p="http://schemas.openxmlformats.org/presentationml/2006/main" type="objAndTwoObj" preserve="1">
   <p:cSld name="Title Content and 2 Content">
     <p:spTree>
       <p:nvGrpSpPr>
@@ -1464,7 +1735,8 @@
           </a:prstGeom>
         </p:spPr>
         <p:txBody>
-          <a:bodyPr lIns="0" rIns="0" tIns="0" bIns="0" anchor="ctr"/>
+          <a:bodyPr lIns="0" tIns="0" rIns="0" bIns="0" anchor="ctr"/>
+          <a:lstStyle/>
           <a:p>
             <a:endParaRPr/>
           </a:p>
@@ -1490,7 +1762,8 @@
           </a:prstGeom>
         </p:spPr>
         <p:txBody>
-          <a:bodyPr lIns="0" rIns="0" tIns="0" bIns="0"/>
+          <a:bodyPr lIns="0" tIns="0" rIns="0" bIns="0"/>
+          <a:lstStyle/>
           <a:p>
             <a:endParaRPr/>
           </a:p>
@@ -1516,7 +1789,8 @@
           </a:prstGeom>
         </p:spPr>
         <p:txBody>
-          <a:bodyPr lIns="0" rIns="0" tIns="0" bIns="0"/>
+          <a:bodyPr lIns="0" tIns="0" rIns="0" bIns="0"/>
+          <a:lstStyle/>
           <a:p>
             <a:endParaRPr/>
           </a:p>
@@ -1542,7 +1816,8 @@
           </a:prstGeom>
         </p:spPr>
         <p:txBody>
-          <a:bodyPr lIns="0" rIns="0" tIns="0" bIns="0"/>
+          <a:bodyPr lIns="0" tIns="0" rIns="0" bIns="0"/>
+          <a:lstStyle/>
           <a:p>
             <a:endParaRPr/>
           </a:p>
@@ -1550,11 +1825,14 @@
       </p:sp>
     </p:spTree>
   </p:cSld>
+  <p:clrMapOvr>
+    <a:masterClrMapping/>
+  </p:clrMapOvr>
 </p:sldLayout>
 </file>
 
 <file path=ppt/slideLayouts/slideLayout9.xml><?xml version="1.0" encoding="utf-8"?>
-<p:sldLayout xmlns:a="http://schemas.openxmlformats.org/drawingml/2006/main" xmlns:p="http://schemas.openxmlformats.org/presentationml/2006/main" xmlns:r="http://schemas.openxmlformats.org/officeDocument/2006/relationships" type="twoObjOverTx" preserve="1">
+<p:sldLayout xmlns:a="http://schemas.openxmlformats.org/drawingml/2006/main" xmlns:r="http://schemas.openxmlformats.org/officeDocument/2006/relationships" xmlns:p="http://schemas.openxmlformats.org/presentationml/2006/main" type="twoObjOverTx" preserve="1">
   <p:cSld name="Title, 2 Content over Content">
     <p:spTree>
       <p:nvGrpSpPr>
@@ -1590,7 +1868,8 @@
           </a:prstGeom>
         </p:spPr>
         <p:txBody>
-          <a:bodyPr lIns="0" rIns="0" tIns="0" bIns="0" anchor="ctr"/>
+          <a:bodyPr lIns="0" tIns="0" rIns="0" bIns="0" anchor="ctr"/>
+          <a:lstStyle/>
           <a:p>
             <a:endParaRPr/>
           </a:p>
@@ -1616,7 +1895,8 @@
           </a:prstGeom>
         </p:spPr>
         <p:txBody>
-          <a:bodyPr lIns="0" rIns="0" tIns="0" bIns="0"/>
+          <a:bodyPr lIns="0" tIns="0" rIns="0" bIns="0"/>
+          <a:lstStyle/>
           <a:p>
             <a:endParaRPr/>
           </a:p>
@@ -1642,7 +1922,8 @@
           </a:prstGeom>
         </p:spPr>
         <p:txBody>
-          <a:bodyPr lIns="0" rIns="0" tIns="0" bIns="0"/>
+          <a:bodyPr lIns="0" tIns="0" rIns="0" bIns="0"/>
+          <a:lstStyle/>
           <a:p>
             <a:endParaRPr/>
           </a:p>
@@ -1668,7 +1949,8 @@
           </a:prstGeom>
         </p:spPr>
         <p:txBody>
-          <a:bodyPr lIns="0" rIns="0" tIns="0" bIns="0"/>
+          <a:bodyPr lIns="0" tIns="0" rIns="0" bIns="0"/>
+          <a:lstStyle/>
           <a:p>
             <a:endParaRPr/>
           </a:p>
@@ -1676,12 +1958,20 @@
       </p:sp>
     </p:spTree>
   </p:cSld>
+  <p:clrMapOvr>
+    <a:masterClrMapping/>
+  </p:clrMapOvr>
 </p:sldLayout>
 </file>
 
 <file path=ppt/slideMasters/slideMaster1.xml><?xml version="1.0" encoding="utf-8"?>
-<p:sldMaster xmlns:a="http://schemas.openxmlformats.org/drawingml/2006/main" xmlns:p="http://schemas.openxmlformats.org/presentationml/2006/main" xmlns:r="http://schemas.openxmlformats.org/officeDocument/2006/relationships">
+<p:sldMaster xmlns:a="http://schemas.openxmlformats.org/drawingml/2006/main" xmlns:r="http://schemas.openxmlformats.org/officeDocument/2006/relationships" xmlns:p="http://schemas.openxmlformats.org/presentationml/2006/main">
   <p:cSld>
+    <p:bg>
+      <p:bgRef idx="1001">
+        <a:schemeClr val="bg1"/>
+      </p:bgRef>
+    </p:bg>
     <p:spTree>
       <p:nvGrpSpPr>
         <p:cNvPr id="1" name=""/>
@@ -1698,7 +1988,7 @@
       </p:grpSpPr>
       <p:sp>
         <p:nvSpPr>
-          <p:cNvPr id="0" name="PlaceHolder 1"/>
+          <p:cNvPr id="5" name="PlaceHolder 1"/>
           <p:cNvSpPr>
             <a:spLocks noGrp="1"/>
           </p:cNvSpPr>
@@ -1716,15 +2006,16 @@
           </a:prstGeom>
         </p:spPr>
         <p:txBody>
-          <a:bodyPr lIns="0" rIns="0" tIns="0" bIns="0"/>
-          <a:p>
-            <a:endParaRPr/>
-          </a:p>
-        </p:txBody>
-      </p:sp>
-      <p:sp>
-        <p:nvSpPr>
-          <p:cNvPr id="1" name="PlaceHolder 2"/>
+          <a:bodyPr lIns="0" tIns="0" rIns="0" bIns="0"/>
+          <a:lstStyle/>
+          <a:p>
+            <a:endParaRPr/>
+          </a:p>
+        </p:txBody>
+      </p:sp>
+      <p:sp>
+        <p:nvSpPr>
+          <p:cNvPr id="6" name="PlaceHolder 2"/>
           <p:cNvSpPr>
             <a:spLocks noGrp="1"/>
           </p:cNvSpPr>
@@ -1742,7 +2033,8 @@
           </a:prstGeom>
         </p:spPr>
         <p:txBody>
-          <a:bodyPr lIns="0" rIns="0" tIns="0" bIns="0"/>
+          <a:bodyPr lIns="0" tIns="0" rIns="0" bIns="0"/>
+          <a:lstStyle/>
           <a:p>
             <a:endParaRPr/>
           </a:p>
@@ -1768,7 +2060,8 @@
           </a:prstGeom>
         </p:spPr>
         <p:txBody>
-          <a:bodyPr lIns="0" rIns="0" tIns="0" bIns="0"/>
+          <a:bodyPr lIns="0" tIns="0" rIns="0" bIns="0"/>
+          <a:lstStyle/>
           <a:p>
             <a:pPr>
               <a:lnSpc>
@@ -1783,7 +2076,7 @@
                 <a:latin typeface="Times New Roman"/>
                 <a:ea typeface="Arial Unicode MS"/>
               </a:rPr>
-              <a:t>&lt;number&gt;</a:t>
+              <a:t>‹#›</a:t>
             </a:fld>
             <a:endParaRPr/>
           </a:p>
@@ -1809,7 +2102,8 @@
           </a:prstGeom>
         </p:spPr>
         <p:txBody>
-          <a:bodyPr lIns="0" rIns="0" tIns="0" bIns="0" anchor="ctr"/>
+          <a:bodyPr lIns="0" tIns="0" rIns="0" bIns="0" anchor="ctr"/>
+          <a:lstStyle/>
           <a:p>
             <a:r>
               <a:rPr lang="it-IT">
@@ -1841,7 +2135,8 @@
           </a:prstGeom>
         </p:spPr>
         <p:txBody>
-          <a:bodyPr lIns="0" rIns="0" tIns="0" bIns="0"/>
+          <a:bodyPr lIns="0" tIns="0" rIns="0" bIns="0"/>
+          <a:lstStyle/>
           <a:p>
             <a:pPr>
               <a:buSzPct val="45000"/>
@@ -1944,26 +2239,306 @@
       </p:sp>
     </p:spTree>
   </p:cSld>
-  <p:clrMap bg1="lt1" bg2="lt2" tx1="dk1" tx2="dk2" accent1="accent1" accent2="accent2" accent3="accent3" accent4="accent4" accent5="accent5" accent6="accent6" hlink="hlink" folHlink="folHlink"/>
+  <p:clrMap bg1="lt1" tx1="dk1" bg2="lt2" tx2="dk2" accent1="accent1" accent2="accent2" accent3="accent3" accent4="accent4" accent5="accent5" accent6="accent6" hlink="hlink" folHlink="folHlink"/>
   <p:sldLayoutIdLst>
-    <p:sldLayoutId id="2147483649" r:id="rId2"/>
-    <p:sldLayoutId id="2147483650" r:id="rId3"/>
-    <p:sldLayoutId id="2147483651" r:id="rId4"/>
-    <p:sldLayoutId id="2147483652" r:id="rId5"/>
-    <p:sldLayoutId id="2147483653" r:id="rId6"/>
-    <p:sldLayoutId id="2147483654" r:id="rId7"/>
-    <p:sldLayoutId id="2147483655" r:id="rId8"/>
-    <p:sldLayoutId id="2147483656" r:id="rId9"/>
-    <p:sldLayoutId id="2147483657" r:id="rId10"/>
-    <p:sldLayoutId id="2147483658" r:id="rId11"/>
-    <p:sldLayoutId id="2147483659" r:id="rId12"/>
-    <p:sldLayoutId id="2147483660" r:id="rId13"/>
+    <p:sldLayoutId id="2147483649" r:id="rId1"/>
+    <p:sldLayoutId id="2147483650" r:id="rId2"/>
+    <p:sldLayoutId id="2147483651" r:id="rId3"/>
+    <p:sldLayoutId id="2147483652" r:id="rId4"/>
+    <p:sldLayoutId id="2147483653" r:id="rId5"/>
+    <p:sldLayoutId id="2147483654" r:id="rId6"/>
+    <p:sldLayoutId id="2147483655" r:id="rId7"/>
+    <p:sldLayoutId id="2147483656" r:id="rId8"/>
+    <p:sldLayoutId id="2147483657" r:id="rId9"/>
+    <p:sldLayoutId id="2147483658" r:id="rId10"/>
+    <p:sldLayoutId id="2147483659" r:id="rId11"/>
+    <p:sldLayoutId id="2147483660" r:id="rId12"/>
   </p:sldLayoutIdLst>
+  <p:txStyles>
+    <p:titleStyle>
+      <a:lvl1pPr algn="l" defTabSz="914400" rtl="0" eaLnBrk="1" latinLnBrk="0" hangingPunct="1">
+        <a:lnSpc>
+          <a:spcPct val="90000"/>
+        </a:lnSpc>
+        <a:spcBef>
+          <a:spcPct val="0"/>
+        </a:spcBef>
+        <a:buNone/>
+        <a:defRPr sz="4400" kern="1200">
+          <a:solidFill>
+            <a:schemeClr val="tx1"/>
+          </a:solidFill>
+          <a:latin typeface="+mj-lt"/>
+          <a:ea typeface="+mj-ea"/>
+          <a:cs typeface="+mj-cs"/>
+        </a:defRPr>
+      </a:lvl1pPr>
+    </p:titleStyle>
+    <p:bodyStyle>
+      <a:lvl1pPr marL="228600" indent="-228600" algn="l" defTabSz="914400" rtl="0" eaLnBrk="1" latinLnBrk="0" hangingPunct="1">
+        <a:lnSpc>
+          <a:spcPct val="90000"/>
+        </a:lnSpc>
+        <a:spcBef>
+          <a:spcPts val="1000"/>
+        </a:spcBef>
+        <a:buFont typeface="Arial" panose="020B0604020202020204" pitchFamily="34" charset="0"/>
+        <a:buChar char="•"/>
+        <a:defRPr sz="2800" kern="1200">
+          <a:solidFill>
+            <a:schemeClr val="tx1"/>
+          </a:solidFill>
+          <a:latin typeface="+mn-lt"/>
+          <a:ea typeface="+mn-ea"/>
+          <a:cs typeface="+mn-cs"/>
+        </a:defRPr>
+      </a:lvl1pPr>
+      <a:lvl2pPr marL="685800" indent="-228600" algn="l" defTabSz="914400" rtl="0" eaLnBrk="1" latinLnBrk="0" hangingPunct="1">
+        <a:lnSpc>
+          <a:spcPct val="90000"/>
+        </a:lnSpc>
+        <a:spcBef>
+          <a:spcPts val="500"/>
+        </a:spcBef>
+        <a:buFont typeface="Arial" panose="020B0604020202020204" pitchFamily="34" charset="0"/>
+        <a:buChar char="•"/>
+        <a:defRPr sz="2400" kern="1200">
+          <a:solidFill>
+            <a:schemeClr val="tx1"/>
+          </a:solidFill>
+          <a:latin typeface="+mn-lt"/>
+          <a:ea typeface="+mn-ea"/>
+          <a:cs typeface="+mn-cs"/>
+        </a:defRPr>
+      </a:lvl2pPr>
+      <a:lvl3pPr marL="1143000" indent="-228600" algn="l" defTabSz="914400" rtl="0" eaLnBrk="1" latinLnBrk="0" hangingPunct="1">
+        <a:lnSpc>
+          <a:spcPct val="90000"/>
+        </a:lnSpc>
+        <a:spcBef>
+          <a:spcPts val="500"/>
+        </a:spcBef>
+        <a:buFont typeface="Arial" panose="020B0604020202020204" pitchFamily="34" charset="0"/>
+        <a:buChar char="•"/>
+        <a:defRPr sz="2000" kern="1200">
+          <a:solidFill>
+            <a:schemeClr val="tx1"/>
+          </a:solidFill>
+          <a:latin typeface="+mn-lt"/>
+          <a:ea typeface="+mn-ea"/>
+          <a:cs typeface="+mn-cs"/>
+        </a:defRPr>
+      </a:lvl3pPr>
+      <a:lvl4pPr marL="1600200" indent="-228600" algn="l" defTabSz="914400" rtl="0" eaLnBrk="1" latinLnBrk="0" hangingPunct="1">
+        <a:lnSpc>
+          <a:spcPct val="90000"/>
+        </a:lnSpc>
+        <a:spcBef>
+          <a:spcPts val="500"/>
+        </a:spcBef>
+        <a:buFont typeface="Arial" panose="020B0604020202020204" pitchFamily="34" charset="0"/>
+        <a:buChar char="•"/>
+        <a:defRPr sz="1800" kern="1200">
+          <a:solidFill>
+            <a:schemeClr val="tx1"/>
+          </a:solidFill>
+          <a:latin typeface="+mn-lt"/>
+          <a:ea typeface="+mn-ea"/>
+          <a:cs typeface="+mn-cs"/>
+        </a:defRPr>
+      </a:lvl4pPr>
+      <a:lvl5pPr marL="2057400" indent="-228600" algn="l" defTabSz="914400" rtl="0" eaLnBrk="1" latinLnBrk="0" hangingPunct="1">
+        <a:lnSpc>
+          <a:spcPct val="90000"/>
+        </a:lnSpc>
+        <a:spcBef>
+          <a:spcPts val="500"/>
+        </a:spcBef>
+        <a:buFont typeface="Arial" panose="020B0604020202020204" pitchFamily="34" charset="0"/>
+        <a:buChar char="•"/>
+        <a:defRPr sz="1800" kern="1200">
+          <a:solidFill>
+            <a:schemeClr val="tx1"/>
+          </a:solidFill>
+          <a:latin typeface="+mn-lt"/>
+          <a:ea typeface="+mn-ea"/>
+          <a:cs typeface="+mn-cs"/>
+        </a:defRPr>
+      </a:lvl5pPr>
+      <a:lvl6pPr marL="2514600" indent="-228600" algn="l" defTabSz="914400" rtl="0" eaLnBrk="1" latinLnBrk="0" hangingPunct="1">
+        <a:lnSpc>
+          <a:spcPct val="90000"/>
+        </a:lnSpc>
+        <a:spcBef>
+          <a:spcPts val="500"/>
+        </a:spcBef>
+        <a:buFont typeface="Arial" panose="020B0604020202020204" pitchFamily="34" charset="0"/>
+        <a:buChar char="•"/>
+        <a:defRPr sz="1800" kern="1200">
+          <a:solidFill>
+            <a:schemeClr val="tx1"/>
+          </a:solidFill>
+          <a:latin typeface="+mn-lt"/>
+          <a:ea typeface="+mn-ea"/>
+          <a:cs typeface="+mn-cs"/>
+        </a:defRPr>
+      </a:lvl6pPr>
+      <a:lvl7pPr marL="2971800" indent="-228600" algn="l" defTabSz="914400" rtl="0" eaLnBrk="1" latinLnBrk="0" hangingPunct="1">
+        <a:lnSpc>
+          <a:spcPct val="90000"/>
+        </a:lnSpc>
+        <a:spcBef>
+          <a:spcPts val="500"/>
+        </a:spcBef>
+        <a:buFont typeface="Arial" panose="020B0604020202020204" pitchFamily="34" charset="0"/>
+        <a:buChar char="•"/>
+        <a:defRPr sz="1800" kern="1200">
+          <a:solidFill>
+            <a:schemeClr val="tx1"/>
+          </a:solidFill>
+          <a:latin typeface="+mn-lt"/>
+          <a:ea typeface="+mn-ea"/>
+          <a:cs typeface="+mn-cs"/>
+        </a:defRPr>
+      </a:lvl7pPr>
+      <a:lvl8pPr marL="3429000" indent="-228600" algn="l" defTabSz="914400" rtl="0" eaLnBrk="1" latinLnBrk="0" hangingPunct="1">
+        <a:lnSpc>
+          <a:spcPct val="90000"/>
+        </a:lnSpc>
+        <a:spcBef>
+          <a:spcPts val="500"/>
+        </a:spcBef>
+        <a:buFont typeface="Arial" panose="020B0604020202020204" pitchFamily="34" charset="0"/>
+        <a:buChar char="•"/>
+        <a:defRPr sz="1800" kern="1200">
+          <a:solidFill>
+            <a:schemeClr val="tx1"/>
+          </a:solidFill>
+          <a:latin typeface="+mn-lt"/>
+          <a:ea typeface="+mn-ea"/>
+          <a:cs typeface="+mn-cs"/>
+        </a:defRPr>
+      </a:lvl8pPr>
+      <a:lvl9pPr marL="3886200" indent="-228600" algn="l" defTabSz="914400" rtl="0" eaLnBrk="1" latinLnBrk="0" hangingPunct="1">
+        <a:lnSpc>
+          <a:spcPct val="90000"/>
+        </a:lnSpc>
+        <a:spcBef>
+          <a:spcPts val="500"/>
+        </a:spcBef>
+        <a:buFont typeface="Arial" panose="020B0604020202020204" pitchFamily="34" charset="0"/>
+        <a:buChar char="•"/>
+        <a:defRPr sz="1800" kern="1200">
+          <a:solidFill>
+            <a:schemeClr val="tx1"/>
+          </a:solidFill>
+          <a:latin typeface="+mn-lt"/>
+          <a:ea typeface="+mn-ea"/>
+          <a:cs typeface="+mn-cs"/>
+        </a:defRPr>
+      </a:lvl9pPr>
+    </p:bodyStyle>
+    <p:otherStyle>
+      <a:defPPr>
+        <a:defRPr lang="en-US"/>
+      </a:defPPr>
+      <a:lvl1pPr marL="0" algn="l" defTabSz="914400" rtl="0" eaLnBrk="1" latinLnBrk="0" hangingPunct="1">
+        <a:defRPr sz="1800" kern="1200">
+          <a:solidFill>
+            <a:schemeClr val="tx1"/>
+          </a:solidFill>
+          <a:latin typeface="+mn-lt"/>
+          <a:ea typeface="+mn-ea"/>
+          <a:cs typeface="+mn-cs"/>
+        </a:defRPr>
+      </a:lvl1pPr>
+      <a:lvl2pPr marL="457200" algn="l" defTabSz="914400" rtl="0" eaLnBrk="1" latinLnBrk="0" hangingPunct="1">
+        <a:defRPr sz="1800" kern="1200">
+          <a:solidFill>
+            <a:schemeClr val="tx1"/>
+          </a:solidFill>
+          <a:latin typeface="+mn-lt"/>
+          <a:ea typeface="+mn-ea"/>
+          <a:cs typeface="+mn-cs"/>
+        </a:defRPr>
+      </a:lvl2pPr>
+      <a:lvl3pPr marL="914400" algn="l" defTabSz="914400" rtl="0" eaLnBrk="1" latinLnBrk="0" hangingPunct="1">
+        <a:defRPr sz="1800" kern="1200">
+          <a:solidFill>
+            <a:schemeClr val="tx1"/>
+          </a:solidFill>
+          <a:latin typeface="+mn-lt"/>
+          <a:ea typeface="+mn-ea"/>
+          <a:cs typeface="+mn-cs"/>
+        </a:defRPr>
+      </a:lvl3pPr>
+      <a:lvl4pPr marL="1371600" algn="l" defTabSz="914400" rtl="0" eaLnBrk="1" latinLnBrk="0" hangingPunct="1">
+        <a:defRPr sz="1800" kern="1200">
+          <a:solidFill>
+            <a:schemeClr val="tx1"/>
+          </a:solidFill>
+          <a:latin typeface="+mn-lt"/>
+          <a:ea typeface="+mn-ea"/>
+          <a:cs typeface="+mn-cs"/>
+        </a:defRPr>
+      </a:lvl4pPr>
+      <a:lvl5pPr marL="1828800" algn="l" defTabSz="914400" rtl="0" eaLnBrk="1" latinLnBrk="0" hangingPunct="1">
+        <a:defRPr sz="1800" kern="1200">
+          <a:solidFill>
+            <a:schemeClr val="tx1"/>
+          </a:solidFill>
+          <a:latin typeface="+mn-lt"/>
+          <a:ea typeface="+mn-ea"/>
+          <a:cs typeface="+mn-cs"/>
+        </a:defRPr>
+      </a:lvl5pPr>
+      <a:lvl6pPr marL="2286000" algn="l" defTabSz="914400" rtl="0" eaLnBrk="1" latinLnBrk="0" hangingPunct="1">
+        <a:defRPr sz="1800" kern="1200">
+          <a:solidFill>
+            <a:schemeClr val="tx1"/>
+          </a:solidFill>
+          <a:latin typeface="+mn-lt"/>
+          <a:ea typeface="+mn-ea"/>
+          <a:cs typeface="+mn-cs"/>
+        </a:defRPr>
+      </a:lvl6pPr>
+      <a:lvl7pPr marL="2743200" algn="l" defTabSz="914400" rtl="0" eaLnBrk="1" latinLnBrk="0" hangingPunct="1">
+        <a:defRPr sz="1800" kern="1200">
+          <a:solidFill>
+            <a:schemeClr val="tx1"/>
+          </a:solidFill>
+          <a:latin typeface="+mn-lt"/>
+          <a:ea typeface="+mn-ea"/>
+          <a:cs typeface="+mn-cs"/>
+        </a:defRPr>
+      </a:lvl7pPr>
+      <a:lvl8pPr marL="3200400" algn="l" defTabSz="914400" rtl="0" eaLnBrk="1" latinLnBrk="0" hangingPunct="1">
+        <a:defRPr sz="1800" kern="1200">
+          <a:solidFill>
+            <a:schemeClr val="tx1"/>
+          </a:solidFill>
+          <a:latin typeface="+mn-lt"/>
+          <a:ea typeface="+mn-ea"/>
+          <a:cs typeface="+mn-cs"/>
+        </a:defRPr>
+      </a:lvl8pPr>
+      <a:lvl9pPr marL="3657600" algn="l" defTabSz="914400" rtl="0" eaLnBrk="1" latinLnBrk="0" hangingPunct="1">
+        <a:defRPr sz="1800" kern="1200">
+          <a:solidFill>
+            <a:schemeClr val="tx1"/>
+          </a:solidFill>
+          <a:latin typeface="+mn-lt"/>
+          <a:ea typeface="+mn-ea"/>
+          <a:cs typeface="+mn-cs"/>
+        </a:defRPr>
+      </a:lvl9pPr>
+    </p:otherStyle>
+  </p:txStyles>
 </p:sldMaster>
 </file>
 
 <file path=ppt/slides/slide1.xml><?xml version="1.0" encoding="utf-8"?>
-<p:sld xmlns:a="http://schemas.openxmlformats.org/drawingml/2006/main" xmlns:p="http://schemas.openxmlformats.org/presentationml/2006/main" xmlns:r="http://schemas.openxmlformats.org/officeDocument/2006/relationships">
+<p:sld xmlns:a="http://schemas.openxmlformats.org/drawingml/2006/main" xmlns:r="http://schemas.openxmlformats.org/officeDocument/2006/relationships" xmlns:p="http://schemas.openxmlformats.org/presentationml/2006/main">
   <p:cSld>
     <p:spTree>
       <p:nvGrpSpPr>
@@ -1981,57 +2556,7 @@
       </p:grpSpPr>
       <p:pic>
         <p:nvPicPr>
-          <p:cNvPr id="44" name="Grafik 9" descr=""/>
-          <p:cNvPicPr/>
-          <p:nvPr/>
-        </p:nvPicPr>
-        <p:blipFill>
-          <a:blip r:embed="rId1"/>
-          <a:stretch>
-            <a:fillRect/>
-          </a:stretch>
-        </p:blipFill>
-        <p:spPr>
-          <a:xfrm>
-            <a:off x="204840" y="42120"/>
-            <a:ext cx="1229400" cy="604440"/>
-          </a:xfrm>
-          <a:prstGeom prst="rect">
-            <a:avLst/>
-          </a:prstGeom>
-          <a:ln>
-            <a:noFill/>
-          </a:ln>
-        </p:spPr>
-      </p:pic>
-      <p:pic>
-        <p:nvPicPr>
-          <p:cNvPr id="45" name="Grafik 12" descr=""/>
-          <p:cNvPicPr/>
-          <p:nvPr/>
-        </p:nvPicPr>
-        <p:blipFill>
-          <a:blip r:embed="rId2"/>
-          <a:stretch>
-            <a:fillRect/>
-          </a:stretch>
-        </p:blipFill>
-        <p:spPr>
-          <a:xfrm>
-            <a:off x="0" y="4391640"/>
-            <a:ext cx="7467840" cy="2303640"/>
-          </a:xfrm>
-          <a:prstGeom prst="rect">
-            <a:avLst/>
-          </a:prstGeom>
-          <a:ln>
-            <a:noFill/>
-          </a:ln>
-        </p:spPr>
-      </p:pic>
-      <p:pic>
-        <p:nvPicPr>
-          <p:cNvPr id="46" name="Grafik 13" descr=""/>
+          <p:cNvPr id="44" name="Grafik 9"/>
           <p:cNvPicPr/>
           <p:nvPr/>
         </p:nvPicPr>
@@ -2043,8 +2568,8 @@
         </p:blipFill>
         <p:spPr>
           <a:xfrm>
-            <a:off x="4933080" y="5558760"/>
-            <a:ext cx="5147640" cy="2000880"/>
+            <a:off x="204840" y="42120"/>
+            <a:ext cx="1229400" cy="604440"/>
           </a:xfrm>
           <a:prstGeom prst="rect">
             <a:avLst/>
@@ -2056,7 +2581,7 @@
       </p:pic>
       <p:pic>
         <p:nvPicPr>
-          <p:cNvPr id="47" name="Grafik 8" descr=""/>
+          <p:cNvPr id="45" name="Grafik 12"/>
           <p:cNvPicPr/>
           <p:nvPr/>
         </p:nvPicPr>
@@ -2068,8 +2593,8 @@
         </p:blipFill>
         <p:spPr>
           <a:xfrm>
-            <a:off x="0" y="6659640"/>
-            <a:ext cx="4932720" cy="899640"/>
+            <a:off x="0" y="4391640"/>
+            <a:ext cx="7467840" cy="2303640"/>
           </a:xfrm>
           <a:prstGeom prst="rect">
             <a:avLst/>
@@ -2081,7 +2606,7 @@
       </p:pic>
       <p:pic>
         <p:nvPicPr>
-          <p:cNvPr id="48" name="Grafik 7" descr=""/>
+          <p:cNvPr id="46" name="Grafik 13"/>
           <p:cNvPicPr/>
           <p:nvPr/>
         </p:nvPicPr>
@@ -2093,8 +2618,8 @@
         </p:blipFill>
         <p:spPr>
           <a:xfrm>
-            <a:off x="7528320" y="4355640"/>
-            <a:ext cx="2491920" cy="1187640"/>
+            <a:off x="4933080" y="5558760"/>
+            <a:ext cx="5147640" cy="2000880"/>
           </a:xfrm>
           <a:prstGeom prst="rect">
             <a:avLst/>
@@ -2106,7 +2631,7 @@
       </p:pic>
       <p:pic>
         <p:nvPicPr>
-          <p:cNvPr id="49" name="Grafik 1" descr=""/>
+          <p:cNvPr id="47" name="Grafik 8"/>
           <p:cNvPicPr/>
           <p:nvPr/>
         </p:nvPicPr>
@@ -2118,8 +2643,8 @@
         </p:blipFill>
         <p:spPr>
           <a:xfrm>
-            <a:off x="7163280" y="76320"/>
-            <a:ext cx="2857320" cy="685440"/>
+            <a:off x="0" y="6659640"/>
+            <a:ext cx="4932720" cy="899640"/>
           </a:xfrm>
           <a:prstGeom prst="rect">
             <a:avLst/>
@@ -2131,7 +2656,7 @@
       </p:pic>
       <p:pic>
         <p:nvPicPr>
-          <p:cNvPr id="50" name="" descr=""/>
+          <p:cNvPr id="48" name="Grafik 7"/>
           <p:cNvPicPr/>
           <p:nvPr/>
         </p:nvPicPr>
@@ -2143,8 +2668,8 @@
         </p:blipFill>
         <p:spPr>
           <a:xfrm>
-            <a:off x="5486400" y="73440"/>
-            <a:ext cx="1097280" cy="640080"/>
+            <a:off x="7528320" y="4355640"/>
+            <a:ext cx="2491920" cy="1187640"/>
           </a:xfrm>
           <a:prstGeom prst="rect">
             <a:avLst/>
@@ -2156,7 +2681,7 @@
       </p:pic>
       <p:pic>
         <p:nvPicPr>
-          <p:cNvPr id="51" name="" descr=""/>
+          <p:cNvPr id="49" name="Grafik 1"/>
           <p:cNvPicPr/>
           <p:nvPr/>
         </p:nvPicPr>
@@ -2168,8 +2693,8 @@
         </p:blipFill>
         <p:spPr>
           <a:xfrm>
-            <a:off x="4206240" y="91440"/>
-            <a:ext cx="731520" cy="548640"/>
+            <a:off x="7163280" y="76320"/>
+            <a:ext cx="2857320" cy="685440"/>
           </a:xfrm>
           <a:prstGeom prst="rect">
             <a:avLst/>
@@ -2181,7 +2706,7 @@
       </p:pic>
       <p:pic>
         <p:nvPicPr>
-          <p:cNvPr id="52" name="Grafik 5" descr=""/>
+          <p:cNvPr id="52" name="Grafik 5"/>
           <p:cNvPicPr/>
           <p:nvPr/>
         </p:nvPicPr>
@@ -2193,7 +2718,7 @@
         </p:blipFill>
         <p:spPr>
           <a:xfrm>
-            <a:off x="2468880" y="11880"/>
+            <a:off x="2813760" y="59220"/>
             <a:ext cx="920160" cy="719640"/>
           </a:xfrm>
           <a:prstGeom prst="rect">
@@ -2204,8 +2729,47 @@
           </a:ln>
         </p:spPr>
       </p:pic>
+      <p:pic>
+        <p:nvPicPr>
+          <p:cNvPr id="3" name="Picture 2">
+            <a:extLst>
+              <a:ext uri="{FF2B5EF4-FFF2-40B4-BE49-F238E27FC236}">
+                <a16:creationId xmlns:a16="http://schemas.microsoft.com/office/drawing/2014/main" id="{BE291AB4-C38B-4CB2-B3D6-CCFB09A43C90}"/>
+              </a:ext>
+            </a:extLst>
+          </p:cNvPr>
+          <p:cNvPicPr>
+            <a:picLocks noChangeAspect="1"/>
+          </p:cNvPicPr>
+          <p:nvPr/>
+        </p:nvPicPr>
+        <p:blipFill>
+          <a:blip r:embed="rId10">
+            <a:extLst>
+              <a:ext uri="{28A0092B-C50C-407E-A947-70E740481C1C}">
+                <a14:useLocalDpi xmlns:a14="http://schemas.microsoft.com/office/drawing/2010/main" val="0"/>
+              </a:ext>
+            </a:extLst>
+          </a:blip>
+          <a:stretch>
+            <a:fillRect/>
+          </a:stretch>
+        </p:blipFill>
+        <p:spPr>
+          <a:xfrm>
+            <a:off x="4532668" y="118286"/>
+            <a:ext cx="1831863" cy="601507"/>
+          </a:xfrm>
+          <a:prstGeom prst="rect">
+            <a:avLst/>
+          </a:prstGeom>
+        </p:spPr>
+      </p:pic>
     </p:spTree>
   </p:cSld>
+  <p:clrMapOvr>
+    <a:masterClrMapping/>
+  </p:clrMapOvr>
   <p:timing>
     <p:tnLst>
       <p:par>
@@ -2214,14 +2778,14 @@
             <p:seq>
               <p:cTn id="2" nodeType="mainSeq"/>
               <p:prevCondLst>
-                <p:cond delay="0" evt="onPrev">
+                <p:cond evt="onPrev" delay="0">
                   <p:tgtEl>
                     <p:sldTgt/>
                   </p:tgtEl>
                 </p:cond>
               </p:prevCondLst>
               <p:nextCondLst>
-                <p:cond delay="0" evt="onNext">
+                <p:cond evt="onNext" delay="0">
                   <p:tgtEl>
                     <p:sldTgt/>
                   </p:tgtEl>
@@ -2237,7 +2801,7 @@
 </file>
 
 <file path=ppt/slides/slide2.xml><?xml version="1.0" encoding="utf-8"?>
-<p:sld xmlns:a="http://schemas.openxmlformats.org/drawingml/2006/main" xmlns:p="http://schemas.openxmlformats.org/presentationml/2006/main" xmlns:r="http://schemas.openxmlformats.org/officeDocument/2006/relationships">
+<p:sld xmlns:a="http://schemas.openxmlformats.org/drawingml/2006/main" xmlns:r="http://schemas.openxmlformats.org/officeDocument/2006/relationships" xmlns:p="http://schemas.openxmlformats.org/presentationml/2006/main">
   <p:cSld>
     <p:spTree>
       <p:nvGrpSpPr>
@@ -2268,11 +2832,11 @@
             <a:avLst/>
           </a:prstGeom>
           <a:solidFill>
-            <a:srgbClr val="002b5e"/>
+            <a:srgbClr val="002B5E"/>
           </a:solidFill>
           <a:ln w="12600">
             <a:solidFill>
-              <a:srgbClr val="43729d"/>
+              <a:srgbClr val="43729D"/>
             </a:solidFill>
             <a:miter/>
           </a:ln>
@@ -2280,57 +2844,7 @@
       </p:sp>
       <p:pic>
         <p:nvPicPr>
-          <p:cNvPr id="54" name="Grafik 6" descr=""/>
-          <p:cNvPicPr/>
-          <p:nvPr/>
-        </p:nvPicPr>
-        <p:blipFill>
-          <a:blip r:embed="rId1"/>
-          <a:stretch>
-            <a:fillRect/>
-          </a:stretch>
-        </p:blipFill>
-        <p:spPr>
-          <a:xfrm>
-            <a:off x="7163280" y="76320"/>
-            <a:ext cx="2857320" cy="685440"/>
-          </a:xfrm>
-          <a:prstGeom prst="rect">
-            <a:avLst/>
-          </a:prstGeom>
-          <a:ln>
-            <a:noFill/>
-          </a:ln>
-        </p:spPr>
-      </p:pic>
-      <p:pic>
-        <p:nvPicPr>
-          <p:cNvPr id="55" name="Grafik 9" descr=""/>
-          <p:cNvPicPr/>
-          <p:nvPr/>
-        </p:nvPicPr>
-        <p:blipFill>
-          <a:blip r:embed="rId2"/>
-          <a:stretch>
-            <a:fillRect/>
-          </a:stretch>
-        </p:blipFill>
-        <p:spPr>
-          <a:xfrm>
-            <a:off x="204840" y="42120"/>
-            <a:ext cx="1229400" cy="604440"/>
-          </a:xfrm>
-          <a:prstGeom prst="rect">
-            <a:avLst/>
-          </a:prstGeom>
-          <a:ln>
-            <a:noFill/>
-          </a:ln>
-        </p:spPr>
-      </p:pic>
-      <p:pic>
-        <p:nvPicPr>
-          <p:cNvPr id="56" name="Grafik 5" descr=""/>
+          <p:cNvPr id="54" name="Grafik 6"/>
           <p:cNvPicPr/>
           <p:nvPr/>
         </p:nvPicPr>
@@ -2342,8 +2856,8 @@
         </p:blipFill>
         <p:spPr>
           <a:xfrm>
-            <a:off x="2468880" y="12240"/>
-            <a:ext cx="920160" cy="719640"/>
+            <a:off x="7163280" y="76320"/>
+            <a:ext cx="2857320" cy="685440"/>
           </a:xfrm>
           <a:prstGeom prst="rect">
             <a:avLst/>
@@ -2355,7 +2869,7 @@
       </p:pic>
       <p:pic>
         <p:nvPicPr>
-          <p:cNvPr id="57" name="" descr=""/>
+          <p:cNvPr id="55" name="Grafik 9"/>
           <p:cNvPicPr/>
           <p:nvPr/>
         </p:nvPicPr>
@@ -2367,8 +2881,8 @@
         </p:blipFill>
         <p:spPr>
           <a:xfrm>
-            <a:off x="4206240" y="91440"/>
-            <a:ext cx="731520" cy="548640"/>
+            <a:off x="204840" y="42120"/>
+            <a:ext cx="1229400" cy="604440"/>
           </a:xfrm>
           <a:prstGeom prst="rect">
             <a:avLst/>
@@ -2380,7 +2894,13 @@
       </p:pic>
       <p:pic>
         <p:nvPicPr>
-          <p:cNvPr id="58" name="" descr=""/>
+          <p:cNvPr id="8" name="Grafik 5">
+            <a:extLst>
+              <a:ext uri="{FF2B5EF4-FFF2-40B4-BE49-F238E27FC236}">
+                <a16:creationId xmlns:a16="http://schemas.microsoft.com/office/drawing/2014/main" id="{A7666E40-9F7B-4A44-8F27-6647B964641B}"/>
+              </a:ext>
+            </a:extLst>
+          </p:cNvPr>
           <p:cNvPicPr/>
           <p:nvPr/>
         </p:nvPicPr>
@@ -2392,8 +2912,8 @@
         </p:blipFill>
         <p:spPr>
           <a:xfrm>
-            <a:off x="5486400" y="73440"/>
-            <a:ext cx="1097280" cy="640080"/>
+            <a:off x="2813760" y="59220"/>
+            <a:ext cx="920160" cy="719640"/>
           </a:xfrm>
           <a:prstGeom prst="rect">
             <a:avLst/>
@@ -2403,24 +2923,63 @@
           </a:ln>
         </p:spPr>
       </p:pic>
+      <p:pic>
+        <p:nvPicPr>
+          <p:cNvPr id="9" name="Picture 8">
+            <a:extLst>
+              <a:ext uri="{FF2B5EF4-FFF2-40B4-BE49-F238E27FC236}">
+                <a16:creationId xmlns:a16="http://schemas.microsoft.com/office/drawing/2014/main" id="{48DF3E20-489F-4465-9ABB-E1047B3E6305}"/>
+              </a:ext>
+            </a:extLst>
+          </p:cNvPr>
+          <p:cNvPicPr>
+            <a:picLocks noChangeAspect="1"/>
+          </p:cNvPicPr>
+          <p:nvPr/>
+        </p:nvPicPr>
+        <p:blipFill>
+          <a:blip r:embed="rId6">
+            <a:extLst>
+              <a:ext uri="{28A0092B-C50C-407E-A947-70E740481C1C}">
+                <a14:useLocalDpi xmlns:a14="http://schemas.microsoft.com/office/drawing/2010/main" val="0"/>
+              </a:ext>
+            </a:extLst>
+          </a:blip>
+          <a:stretch>
+            <a:fillRect/>
+          </a:stretch>
+        </p:blipFill>
+        <p:spPr>
+          <a:xfrm>
+            <a:off x="4532668" y="118286"/>
+            <a:ext cx="1831863" cy="601507"/>
+          </a:xfrm>
+          <a:prstGeom prst="rect">
+            <a:avLst/>
+          </a:prstGeom>
+        </p:spPr>
+      </p:pic>
     </p:spTree>
   </p:cSld>
+  <p:clrMapOvr>
+    <a:masterClrMapping/>
+  </p:clrMapOvr>
   <p:timing>
     <p:tnLst>
       <p:par>
-        <p:cTn id="3" dur="indefinite" restart="never" nodeType="tmRoot">
+        <p:cTn id="1" dur="indefinite" restart="never" nodeType="tmRoot">
           <p:childTnLst>
             <p:seq>
-              <p:cTn id="4" nodeType="mainSeq"/>
+              <p:cTn id="2" nodeType="mainSeq"/>
               <p:prevCondLst>
-                <p:cond delay="0" evt="onPrev">
+                <p:cond evt="onPrev" delay="0">
                   <p:tgtEl>
                     <p:sldTgt/>
                   </p:tgtEl>
                 </p:cond>
               </p:prevCondLst>
               <p:nextCondLst>
-                <p:cond delay="0" evt="onNext">
+                <p:cond evt="onNext" delay="0">
                   <p:tgtEl>
                     <p:sldTgt/>
                   </p:tgtEl>
@@ -2436,7 +2995,7 @@
 </file>
 
 <file path=ppt/slides/slide3.xml><?xml version="1.0" encoding="utf-8"?>
-<p:sld xmlns:a="http://schemas.openxmlformats.org/drawingml/2006/main" xmlns:p="http://schemas.openxmlformats.org/presentationml/2006/main" xmlns:r="http://schemas.openxmlformats.org/officeDocument/2006/relationships">
+<p:sld xmlns:a="http://schemas.openxmlformats.org/drawingml/2006/main" xmlns:r="http://schemas.openxmlformats.org/officeDocument/2006/relationships" xmlns:p="http://schemas.openxmlformats.org/presentationml/2006/main">
   <p:cSld>
     <p:spTree>
       <p:nvGrpSpPr>
@@ -2467,11 +3026,11 @@
             <a:avLst/>
           </a:prstGeom>
           <a:solidFill>
-            <a:srgbClr val="002b5e"/>
+            <a:srgbClr val="002B5E"/>
           </a:solidFill>
           <a:ln w="12600">
             <a:solidFill>
-              <a:srgbClr val="43729d"/>
+              <a:srgbClr val="43729D"/>
             </a:solidFill>
             <a:miter/>
           </a:ln>
@@ -2479,57 +3038,7 @@
       </p:sp>
       <p:pic>
         <p:nvPicPr>
-          <p:cNvPr id="60" name="Grafik 6" descr=""/>
-          <p:cNvPicPr/>
-          <p:nvPr/>
-        </p:nvPicPr>
-        <p:blipFill>
-          <a:blip r:embed="rId1"/>
-          <a:stretch>
-            <a:fillRect/>
-          </a:stretch>
-        </p:blipFill>
-        <p:spPr>
-          <a:xfrm>
-            <a:off x="7163280" y="76320"/>
-            <a:ext cx="2857320" cy="685440"/>
-          </a:xfrm>
-          <a:prstGeom prst="rect">
-            <a:avLst/>
-          </a:prstGeom>
-          <a:ln>
-            <a:noFill/>
-          </a:ln>
-        </p:spPr>
-      </p:pic>
-      <p:pic>
-        <p:nvPicPr>
-          <p:cNvPr id="61" name="Grafik 9" descr=""/>
-          <p:cNvPicPr/>
-          <p:nvPr/>
-        </p:nvPicPr>
-        <p:blipFill>
-          <a:blip r:embed="rId2"/>
-          <a:stretch>
-            <a:fillRect/>
-          </a:stretch>
-        </p:blipFill>
-        <p:spPr>
-          <a:xfrm>
-            <a:off x="204840" y="42120"/>
-            <a:ext cx="1229400" cy="604440"/>
-          </a:xfrm>
-          <a:prstGeom prst="rect">
-            <a:avLst/>
-          </a:prstGeom>
-          <a:ln>
-            <a:noFill/>
-          </a:ln>
-        </p:spPr>
-      </p:pic>
-      <p:pic>
-        <p:nvPicPr>
-          <p:cNvPr id="62" name="Grafik 5" descr=""/>
+          <p:cNvPr id="60" name="Grafik 6"/>
           <p:cNvPicPr/>
           <p:nvPr/>
         </p:nvPicPr>
@@ -2541,8 +3050,8 @@
         </p:blipFill>
         <p:spPr>
           <a:xfrm>
-            <a:off x="2468880" y="12240"/>
-            <a:ext cx="920160" cy="719640"/>
+            <a:off x="7163280" y="76320"/>
+            <a:ext cx="2857320" cy="685440"/>
           </a:xfrm>
           <a:prstGeom prst="rect">
             <a:avLst/>
@@ -2554,7 +3063,7 @@
       </p:pic>
       <p:pic>
         <p:nvPicPr>
-          <p:cNvPr id="63" name="" descr=""/>
+          <p:cNvPr id="61" name="Grafik 9"/>
           <p:cNvPicPr/>
           <p:nvPr/>
         </p:nvPicPr>
@@ -2566,8 +3075,8 @@
         </p:blipFill>
         <p:spPr>
           <a:xfrm>
-            <a:off x="4206240" y="91440"/>
-            <a:ext cx="731520" cy="548640"/>
+            <a:off x="204840" y="42120"/>
+            <a:ext cx="1229400" cy="604440"/>
           </a:xfrm>
           <a:prstGeom prst="rect">
             <a:avLst/>
@@ -2579,7 +3088,13 @@
       </p:pic>
       <p:pic>
         <p:nvPicPr>
-          <p:cNvPr id="64" name="" descr=""/>
+          <p:cNvPr id="8" name="Grafik 5">
+            <a:extLst>
+              <a:ext uri="{FF2B5EF4-FFF2-40B4-BE49-F238E27FC236}">
+                <a16:creationId xmlns:a16="http://schemas.microsoft.com/office/drawing/2014/main" id="{7E925A03-9868-4EF0-AC81-50D152817518}"/>
+              </a:ext>
+            </a:extLst>
+          </p:cNvPr>
           <p:cNvPicPr/>
           <p:nvPr/>
         </p:nvPicPr>
@@ -2591,8 +3106,8 @@
         </p:blipFill>
         <p:spPr>
           <a:xfrm>
-            <a:off x="5486400" y="73440"/>
-            <a:ext cx="1097280" cy="640080"/>
+            <a:off x="2813760" y="59220"/>
+            <a:ext cx="920160" cy="719640"/>
           </a:xfrm>
           <a:prstGeom prst="rect">
             <a:avLst/>
@@ -2602,24 +3117,63 @@
           </a:ln>
         </p:spPr>
       </p:pic>
+      <p:pic>
+        <p:nvPicPr>
+          <p:cNvPr id="9" name="Picture 8">
+            <a:extLst>
+              <a:ext uri="{FF2B5EF4-FFF2-40B4-BE49-F238E27FC236}">
+                <a16:creationId xmlns:a16="http://schemas.microsoft.com/office/drawing/2014/main" id="{DA0566A8-EBF4-4D9C-9D44-43912B1EF14A}"/>
+              </a:ext>
+            </a:extLst>
+          </p:cNvPr>
+          <p:cNvPicPr>
+            <a:picLocks noChangeAspect="1"/>
+          </p:cNvPicPr>
+          <p:nvPr/>
+        </p:nvPicPr>
+        <p:blipFill>
+          <a:blip r:embed="rId6">
+            <a:extLst>
+              <a:ext uri="{28A0092B-C50C-407E-A947-70E740481C1C}">
+                <a14:useLocalDpi xmlns:a14="http://schemas.microsoft.com/office/drawing/2010/main" val="0"/>
+              </a:ext>
+            </a:extLst>
+          </a:blip>
+          <a:stretch>
+            <a:fillRect/>
+          </a:stretch>
+        </p:blipFill>
+        <p:spPr>
+          <a:xfrm>
+            <a:off x="4532668" y="118286"/>
+            <a:ext cx="1831863" cy="601507"/>
+          </a:xfrm>
+          <a:prstGeom prst="rect">
+            <a:avLst/>
+          </a:prstGeom>
+        </p:spPr>
+      </p:pic>
     </p:spTree>
   </p:cSld>
+  <p:clrMapOvr>
+    <a:masterClrMapping/>
+  </p:clrMapOvr>
   <p:timing>
     <p:tnLst>
       <p:par>
-        <p:cTn id="5" dur="indefinite" restart="never" nodeType="tmRoot">
+        <p:cTn id="1" dur="indefinite" restart="never" nodeType="tmRoot">
           <p:childTnLst>
             <p:seq>
-              <p:cTn id="6" nodeType="mainSeq"/>
+              <p:cTn id="2" nodeType="mainSeq"/>
               <p:prevCondLst>
-                <p:cond delay="0" evt="onPrev">
+                <p:cond evt="onPrev" delay="0">
                   <p:tgtEl>
                     <p:sldTgt/>
                   </p:tgtEl>
                 </p:cond>
               </p:prevCondLst>
               <p:nextCondLst>
-                <p:cond delay="0" evt="onNext">
+                <p:cond evt="onNext" delay="0">
                   <p:tgtEl>
                     <p:sldTgt/>
                   </p:tgtEl>
@@ -2635,7 +3189,7 @@
 </file>
 
 <file path=ppt/slides/slide4.xml><?xml version="1.0" encoding="utf-8"?>
-<p:sld xmlns:a="http://schemas.openxmlformats.org/drawingml/2006/main" xmlns:p="http://schemas.openxmlformats.org/presentationml/2006/main" xmlns:r="http://schemas.openxmlformats.org/officeDocument/2006/relationships">
+<p:sld xmlns:a="http://schemas.openxmlformats.org/drawingml/2006/main" xmlns:r="http://schemas.openxmlformats.org/officeDocument/2006/relationships" xmlns:p="http://schemas.openxmlformats.org/presentationml/2006/main">
   <p:cSld>
     <p:spTree>
       <p:nvGrpSpPr>
@@ -2653,57 +3207,7 @@
       </p:grpSpPr>
       <p:pic>
         <p:nvPicPr>
-          <p:cNvPr id="65" name="Grafik 6" descr=""/>
-          <p:cNvPicPr/>
-          <p:nvPr/>
-        </p:nvPicPr>
-        <p:blipFill>
-          <a:blip r:embed="rId1"/>
-          <a:stretch>
-            <a:fillRect/>
-          </a:stretch>
-        </p:blipFill>
-        <p:spPr>
-          <a:xfrm>
-            <a:off x="0" y="0"/>
-            <a:ext cx="10080360" cy="3774600"/>
-          </a:xfrm>
-          <a:prstGeom prst="rect">
-            <a:avLst/>
-          </a:prstGeom>
-          <a:ln>
-            <a:noFill/>
-          </a:ln>
-        </p:spPr>
-      </p:pic>
-      <p:pic>
-        <p:nvPicPr>
-          <p:cNvPr id="66" name="Grafik 7" descr=""/>
-          <p:cNvPicPr/>
-          <p:nvPr/>
-        </p:nvPicPr>
-        <p:blipFill>
-          <a:blip r:embed="rId2"/>
-          <a:stretch>
-            <a:fillRect/>
-          </a:stretch>
-        </p:blipFill>
-        <p:spPr>
-          <a:xfrm>
-            <a:off x="0" y="3774960"/>
-            <a:ext cx="10080360" cy="3784320"/>
-          </a:xfrm>
-          <a:prstGeom prst="rect">
-            <a:avLst/>
-          </a:prstGeom>
-          <a:ln>
-            <a:noFill/>
-          </a:ln>
-        </p:spPr>
-      </p:pic>
-      <p:pic>
-        <p:nvPicPr>
-          <p:cNvPr id="67" name="Grafik 8" descr=""/>
+          <p:cNvPr id="65" name="Grafik 6"/>
           <p:cNvPicPr/>
           <p:nvPr/>
         </p:nvPicPr>
@@ -2715,8 +3219,8 @@
         </p:blipFill>
         <p:spPr>
           <a:xfrm>
-            <a:off x="7437240" y="6299640"/>
-            <a:ext cx="2643120" cy="1259640"/>
+            <a:off x="0" y="0"/>
+            <a:ext cx="10080360" cy="3774600"/>
           </a:xfrm>
           <a:prstGeom prst="rect">
             <a:avLst/>
@@ -2728,7 +3232,7 @@
       </p:pic>
       <p:pic>
         <p:nvPicPr>
-          <p:cNvPr id="68" name="Grafik 9" descr=""/>
+          <p:cNvPr id="66" name="Grafik 7"/>
           <p:cNvPicPr/>
           <p:nvPr/>
         </p:nvPicPr>
@@ -2740,8 +3244,8 @@
         </p:blipFill>
         <p:spPr>
           <a:xfrm>
-            <a:off x="-12600" y="0"/>
-            <a:ext cx="1610280" cy="1259640"/>
+            <a:off x="0" y="3774960"/>
+            <a:ext cx="10080360" cy="3784320"/>
           </a:xfrm>
           <a:prstGeom prst="rect">
             <a:avLst/>
@@ -2753,7 +3257,7 @@
       </p:pic>
       <p:pic>
         <p:nvPicPr>
-          <p:cNvPr id="69" name="Grafik 4" descr=""/>
+          <p:cNvPr id="67" name="Grafik 8"/>
           <p:cNvPicPr/>
           <p:nvPr/>
         </p:nvPicPr>
@@ -2765,8 +3269,8 @@
         </p:blipFill>
         <p:spPr>
           <a:xfrm>
-            <a:off x="0" y="6299640"/>
-            <a:ext cx="2562480" cy="1259640"/>
+            <a:off x="7437240" y="6299640"/>
+            <a:ext cx="2643120" cy="1259640"/>
           </a:xfrm>
           <a:prstGeom prst="rect">
             <a:avLst/>
@@ -2778,7 +3282,7 @@
       </p:pic>
       <p:pic>
         <p:nvPicPr>
-          <p:cNvPr id="70" name="Grafik 10" descr=""/>
+          <p:cNvPr id="68" name="Grafik 9"/>
           <p:cNvPicPr/>
           <p:nvPr/>
         </p:nvPicPr>
@@ -2790,8 +3294,8 @@
         </p:blipFill>
         <p:spPr>
           <a:xfrm>
-            <a:off x="7223040" y="0"/>
-            <a:ext cx="2857320" cy="685440"/>
+            <a:off x="-12600" y="0"/>
+            <a:ext cx="1610280" cy="1259640"/>
           </a:xfrm>
           <a:prstGeom prst="rect">
             <a:avLst/>
@@ -2801,24 +3305,77 @@
           </a:ln>
         </p:spPr>
       </p:pic>
+      <p:pic>
+        <p:nvPicPr>
+          <p:cNvPr id="69" name="Grafik 4"/>
+          <p:cNvPicPr/>
+          <p:nvPr/>
+        </p:nvPicPr>
+        <p:blipFill>
+          <a:blip r:embed="rId7"/>
+          <a:stretch>
+            <a:fillRect/>
+          </a:stretch>
+        </p:blipFill>
+        <p:spPr>
+          <a:xfrm>
+            <a:off x="0" y="6299640"/>
+            <a:ext cx="2562480" cy="1259640"/>
+          </a:xfrm>
+          <a:prstGeom prst="rect">
+            <a:avLst/>
+          </a:prstGeom>
+          <a:ln>
+            <a:noFill/>
+          </a:ln>
+        </p:spPr>
+      </p:pic>
+      <p:pic>
+        <p:nvPicPr>
+          <p:cNvPr id="70" name="Grafik 10"/>
+          <p:cNvPicPr/>
+          <p:nvPr/>
+        </p:nvPicPr>
+        <p:blipFill>
+          <a:blip r:embed="rId8"/>
+          <a:stretch>
+            <a:fillRect/>
+          </a:stretch>
+        </p:blipFill>
+        <p:spPr>
+          <a:xfrm>
+            <a:off x="7223040" y="0"/>
+            <a:ext cx="2857320" cy="685440"/>
+          </a:xfrm>
+          <a:prstGeom prst="rect">
+            <a:avLst/>
+          </a:prstGeom>
+          <a:ln>
+            <a:noFill/>
+          </a:ln>
+        </p:spPr>
+      </p:pic>
     </p:spTree>
   </p:cSld>
+  <p:clrMapOvr>
+    <a:masterClrMapping/>
+  </p:clrMapOvr>
   <p:timing>
     <p:tnLst>
       <p:par>
-        <p:cTn id="7" dur="indefinite" restart="never" nodeType="tmRoot">
+        <p:cTn id="1" dur="indefinite" restart="never" nodeType="tmRoot">
           <p:childTnLst>
             <p:seq>
-              <p:cTn id="8" nodeType="mainSeq"/>
+              <p:cTn id="2" nodeType="mainSeq"/>
               <p:prevCondLst>
-                <p:cond delay="0" evt="onPrev">
+                <p:cond evt="onPrev" delay="0">
                   <p:tgtEl>
                     <p:sldTgt/>
                   </p:tgtEl>
                 </p:cond>
               </p:prevCondLst>
               <p:nextCondLst>
-                <p:cond delay="0" evt="onNext">
+                <p:cond evt="onNext" delay="0">
                   <p:tgtEl>
                     <p:sldTgt/>
                   </p:tgtEl>
@@ -3053,6 +3610,8 @@
       </a:bgFillStyleLst>
     </a:fmtScheme>
   </a:themeElements>
+  <a:objectDefaults/>
+  <a:extraClrSchemeLst/>
 </a:theme>
 </file>
 
@@ -3276,5 +3835,7 @@
       </a:bgFillStyleLst>
     </a:fmtScheme>
   </a:themeElements>
+  <a:objectDefaults/>
+  <a:extraClrSchemeLst/>
 </a:theme>
 </file>
</xml_diff>